<commit_message>
Analyyse sowie Präsentation erweitert
Es kamen noch analysen dazu die untersuchen wieviele Cluster an welchen wochen und ferientagen aufgetreten sind.
</commit_message>
<xml_diff>
--- a/Präsentation der Analysen.pptx
+++ b/Präsentation der Analysen.pptx
@@ -5,7 +5,7 @@
     <p:sldMasterId id="2147483648" r:id="rId1"/>
   </p:sldMasterIdLst>
   <p:notesMasterIdLst>
-    <p:notesMasterId r:id="rId19"/>
+    <p:notesMasterId r:id="rId21"/>
   </p:notesMasterIdLst>
   <p:sldIdLst>
     <p:sldId id="273" r:id="rId2"/>
@@ -18,13 +18,15 @@
     <p:sldId id="266" r:id="rId9"/>
     <p:sldId id="257" r:id="rId10"/>
     <p:sldId id="260" r:id="rId11"/>
-    <p:sldId id="269" r:id="rId12"/>
-    <p:sldId id="258" r:id="rId13"/>
-    <p:sldId id="262" r:id="rId14"/>
-    <p:sldId id="261" r:id="rId15"/>
-    <p:sldId id="259" r:id="rId16"/>
-    <p:sldId id="264" r:id="rId17"/>
-    <p:sldId id="274" r:id="rId18"/>
+    <p:sldId id="275" r:id="rId12"/>
+    <p:sldId id="276" r:id="rId13"/>
+    <p:sldId id="269" r:id="rId14"/>
+    <p:sldId id="258" r:id="rId15"/>
+    <p:sldId id="262" r:id="rId16"/>
+    <p:sldId id="261" r:id="rId17"/>
+    <p:sldId id="259" r:id="rId18"/>
+    <p:sldId id="264" r:id="rId19"/>
+    <p:sldId id="274" r:id="rId20"/>
   </p:sldIdLst>
   <p:sldSz cx="12192000" cy="6858000"/>
   <p:notesSz cx="6858000" cy="9144000"/>
@@ -819,159 +821,306 @@
           <a:bodyPr/>
           <a:lstStyle/>
           <a:p>
-            <a:pPr>
-              <a:lnSpc>
-                <a:spcPts val="1425"/>
-              </a:lnSpc>
-              <a:buNone/>
-            </a:pPr>
-            <a:r>
-              <a:rPr lang="de-DE" sz="1200" b="0" dirty="0">
-                <a:effectLst/>
-              </a:rPr>
-              <a:t>Für die Analyse wurden die 15 meistbesuchten Seiten betrachtet. Jede Seite wurde einem Cluster zugeordnet, um die Nutzungsintensität zu kategorisieren. Die genaue Verteilung der Seiten auf die Cluster hängt vom Ergebnis der Clusteranalyse ab und kann variieren.</a:t>
-            </a:r>
-          </a:p>
-          <a:p>
-            <a:pPr>
-              <a:lnSpc>
-                <a:spcPts val="1425"/>
-              </a:lnSpc>
-              <a:buNone/>
-            </a:pPr>
-            <a:endParaRPr lang="de-DE" sz="1200" b="0" dirty="0">
+            <a:r>
+              <a:rPr lang="de-DE" sz="1200" b="1" kern="1200" dirty="0">
+                <a:solidFill>
+                  <a:schemeClr val="tx1"/>
+                </a:solidFill>
+                <a:effectLst/>
+                <a:latin typeface="+mn-lt"/>
+                <a:ea typeface="+mn-ea"/>
+                <a:cs typeface="+mn-cs"/>
+              </a:rPr>
+              <a:t>Ziel der Ergänzungsanalyse  </a:t>
+            </a:r>
+            <a:endParaRPr lang="de-DE" sz="1200" b="0" kern="1200" dirty="0">
+              <a:solidFill>
+                <a:schemeClr val="tx1"/>
+              </a:solidFill>
               <a:effectLst/>
+              <a:latin typeface="+mn-lt"/>
+              <a:ea typeface="+mn-ea"/>
+              <a:cs typeface="+mn-cs"/>
             </a:endParaRPr>
           </a:p>
           <a:p>
-            <a:pPr>
-              <a:lnSpc>
-                <a:spcPts val="1425"/>
-              </a:lnSpc>
-              <a:buNone/>
-            </a:pPr>
+            <a:r>
+              <a:rPr lang="de-DE" sz="1200" b="0" kern="1200" dirty="0">
+                <a:solidFill>
+                  <a:schemeClr val="tx1"/>
+                </a:solidFill>
+                <a:effectLst/>
+                <a:latin typeface="+mn-lt"/>
+                <a:ea typeface="+mn-ea"/>
+                <a:cs typeface="+mn-cs"/>
+              </a:rPr>
+              <a:t>Aufbauend auf der zuvor durchgeführten Clusterbildung analysiert dieser Abschnitt, </a:t>
+            </a:r>
+            <a:r>
+              <a:rPr lang="de-DE" sz="1200" b="1" kern="1200" dirty="0">
+                <a:solidFill>
+                  <a:schemeClr val="tx1"/>
+                </a:solidFill>
+                <a:effectLst/>
+                <a:latin typeface="+mn-lt"/>
+                <a:ea typeface="+mn-ea"/>
+                <a:cs typeface="+mn-cs"/>
+              </a:rPr>
+              <a:t>**wann**</a:t>
+            </a:r>
+            <a:r>
+              <a:rPr lang="de-DE" sz="1200" b="0" kern="1200" dirty="0">
+                <a:solidFill>
+                  <a:schemeClr val="tx1"/>
+                </a:solidFill>
+                <a:effectLst/>
+                <a:latin typeface="+mn-lt"/>
+                <a:ea typeface="+mn-ea"/>
+                <a:cs typeface="+mn-cs"/>
+              </a:rPr>
+              <a:t> bestimmte Nutzertypen besonders häufig auftreten – differenziert nach </a:t>
+            </a:r>
+            <a:r>
+              <a:rPr lang="de-DE" sz="1200" b="1" kern="1200" dirty="0">
+                <a:solidFill>
+                  <a:schemeClr val="tx1"/>
+                </a:solidFill>
+                <a:effectLst/>
+                <a:latin typeface="+mn-lt"/>
+                <a:ea typeface="+mn-ea"/>
+                <a:cs typeface="+mn-cs"/>
+              </a:rPr>
+              <a:t>**Wochentagen**</a:t>
+            </a:r>
+            <a:r>
+              <a:rPr lang="de-DE" sz="1200" b="0" kern="1200" dirty="0">
+                <a:solidFill>
+                  <a:schemeClr val="tx1"/>
+                </a:solidFill>
+                <a:effectLst/>
+                <a:latin typeface="+mn-lt"/>
+                <a:ea typeface="+mn-ea"/>
+                <a:cs typeface="+mn-cs"/>
+              </a:rPr>
+              <a:t> und </a:t>
+            </a:r>
+            <a:r>
+              <a:rPr lang="de-DE" sz="1200" b="1" kern="1200" dirty="0">
+                <a:solidFill>
+                  <a:schemeClr val="tx1"/>
+                </a:solidFill>
+                <a:effectLst/>
+                <a:latin typeface="+mn-lt"/>
+                <a:ea typeface="+mn-ea"/>
+                <a:cs typeface="+mn-cs"/>
+              </a:rPr>
+              <a:t>**Feiertagen**</a:t>
+            </a:r>
+            <a:r>
+              <a:rPr lang="de-DE" sz="1200" b="0" kern="1200" dirty="0">
+                <a:solidFill>
+                  <a:schemeClr val="tx1"/>
+                </a:solidFill>
+                <a:effectLst/>
+                <a:latin typeface="+mn-lt"/>
+                <a:ea typeface="+mn-ea"/>
+                <a:cs typeface="+mn-cs"/>
+              </a:rPr>
+              <a:t>. Ziel ist es, zeitliche Nutzungsmuster in den bereits identifizierten Clustern sichtbar zu machen.</a:t>
+            </a:r>
+          </a:p>
+          <a:p>
             <a:br>
-              <a:rPr lang="de-DE" sz="1200" b="0" dirty="0">
-                <a:effectLst/>
+              <a:rPr lang="de-DE" sz="1200" b="0" kern="1200" dirty="0">
+                <a:solidFill>
+                  <a:schemeClr val="tx1"/>
+                </a:solidFill>
+                <a:effectLst/>
+                <a:latin typeface="+mn-lt"/>
+                <a:ea typeface="+mn-ea"/>
+                <a:cs typeface="+mn-cs"/>
               </a:rPr>
             </a:br>
             <a:r>
-              <a:rPr lang="de-DE" sz="1200" b="1" dirty="0">
-                <a:effectLst/>
-              </a:rPr>
-              <a:t>Warum ist das nützlich?</a:t>
-            </a:r>
-            <a:endParaRPr lang="de-DE" sz="1200" dirty="0"/>
-          </a:p>
-          <a:p>
-            <a:pPr>
-              <a:lnSpc>
-                <a:spcPts val="1425"/>
-              </a:lnSpc>
-              <a:buNone/>
-            </a:pPr>
+              <a:rPr lang="de-DE" sz="1200" b="1" kern="1200" dirty="0">
+                <a:solidFill>
+                  <a:schemeClr val="tx1"/>
+                </a:solidFill>
+                <a:effectLst/>
+                <a:latin typeface="+mn-lt"/>
+                <a:ea typeface="+mn-ea"/>
+                <a:cs typeface="+mn-cs"/>
+              </a:rPr>
+              <a:t>Was macht der Code?  </a:t>
+            </a:r>
+            <a:endParaRPr lang="de-DE" sz="1200" b="0" kern="1200" dirty="0">
+              <a:solidFill>
+                <a:schemeClr val="tx1"/>
+              </a:solidFill>
+              <a:effectLst/>
+              <a:latin typeface="+mn-lt"/>
+              <a:ea typeface="+mn-ea"/>
+              <a:cs typeface="+mn-cs"/>
+            </a:endParaRPr>
+          </a:p>
+          <a:p>
             <a:br>
-              <a:rPr lang="de-DE" sz="1200" b="0" dirty="0">
-                <a:effectLst/>
+              <a:rPr lang="de-DE" sz="1200" b="0" kern="1200" dirty="0">
+                <a:solidFill>
+                  <a:schemeClr val="tx1"/>
+                </a:solidFill>
+                <a:effectLst/>
+                <a:latin typeface="+mn-lt"/>
+                <a:ea typeface="+mn-ea"/>
+                <a:cs typeface="+mn-cs"/>
               </a:rPr>
             </a:br>
             <a:r>
-              <a:rPr lang="de-DE" sz="1200" b="0" dirty="0">
-                <a:effectLst/>
-              </a:rPr>
-              <a:t>Die </a:t>
-            </a:r>
-            <a:r>
-              <a:rPr lang="de-DE" sz="1200" b="1" dirty="0">
-                <a:effectLst/>
-              </a:rPr>
-              <a:t>Cluster helfen dabei, Landingpages nach Nutzungsintensität zu gruppieren</a:t>
-            </a:r>
-            <a:r>
-              <a:rPr lang="de-DE" sz="1200" b="0" dirty="0">
-                <a:effectLst/>
-              </a:rPr>
-              <a:t>, ohne dass man feste Schwellenwerte definieren muss.</a:t>
-            </a:r>
-          </a:p>
-          <a:p>
-            <a:pPr>
-              <a:lnSpc>
-                <a:spcPts val="1425"/>
-              </a:lnSpc>
-              <a:buNone/>
-            </a:pPr>
-            <a:endParaRPr lang="de-DE" sz="1200" b="0" dirty="0">
+              <a:rPr lang="de-DE" sz="1200" b="0" kern="1200" dirty="0">
+                <a:solidFill>
+                  <a:schemeClr val="tx1"/>
+                </a:solidFill>
+                <a:effectLst/>
+                <a:latin typeface="+mn-lt"/>
+                <a:ea typeface="+mn-ea"/>
+                <a:cs typeface="+mn-cs"/>
+              </a:rPr>
+              <a:t>1. </a:t>
+            </a:r>
+            <a:r>
+              <a:rPr lang="de-DE" sz="1200" b="1" kern="1200" dirty="0" err="1">
+                <a:solidFill>
+                  <a:schemeClr val="tx1"/>
+                </a:solidFill>
+                <a:effectLst/>
+                <a:latin typeface="+mn-lt"/>
+                <a:ea typeface="+mn-ea"/>
+                <a:cs typeface="+mn-cs"/>
+              </a:rPr>
+              <a:t>Wochentagsanalyse</a:t>
+            </a:r>
+            <a:r>
+              <a:rPr lang="de-DE" sz="1200" b="1" kern="1200" dirty="0">
+                <a:solidFill>
+                  <a:schemeClr val="tx1"/>
+                </a:solidFill>
+                <a:effectLst/>
+                <a:latin typeface="+mn-lt"/>
+                <a:ea typeface="+mn-ea"/>
+                <a:cs typeface="+mn-cs"/>
+              </a:rPr>
+              <a:t> pro Clustergruppe:</a:t>
+            </a:r>
+            <a:endParaRPr lang="de-DE" sz="1200" b="0" kern="1200" dirty="0">
+              <a:solidFill>
+                <a:schemeClr val="tx1"/>
+              </a:solidFill>
               <a:effectLst/>
+              <a:latin typeface="+mn-lt"/>
+              <a:ea typeface="+mn-ea"/>
+              <a:cs typeface="+mn-cs"/>
             </a:endParaRPr>
           </a:p>
           <a:p>
-            <a:pPr marL="0" indent="0">
-              <a:lnSpc>
-                <a:spcPts val="1425"/>
-              </a:lnSpc>
-              <a:buFont typeface="Arial" panose="020B0604020202020204" pitchFamily="34" charset="0"/>
-              <a:buNone/>
-            </a:pPr>
-            <a:r>
-              <a:rPr lang="de-DE" sz="1200" b="0" dirty="0">
-                <a:effectLst/>
-              </a:rPr>
-              <a:t>So lassen sich beispielsweise Seiten mit </a:t>
-            </a:r>
-            <a:r>
-              <a:rPr lang="de-DE" sz="1200" b="1" dirty="0">
-                <a:effectLst/>
-              </a:rPr>
-              <a:t>Optimierungspotenzial</a:t>
-            </a:r>
-            <a:r>
-              <a:rPr lang="de-DE" sz="1200" b="0" dirty="0">
-                <a:effectLst/>
-              </a:rPr>
-              <a:t> oder solche mit </a:t>
-            </a:r>
-            <a:r>
-              <a:rPr lang="de-DE" sz="1200" b="1" dirty="0">
-                <a:effectLst/>
-              </a:rPr>
-              <a:t>besonders hoher Sichtbarkeit</a:t>
-            </a:r>
-            <a:r>
-              <a:rPr lang="de-DE" sz="1200" b="0" dirty="0">
-                <a:effectLst/>
-              </a:rPr>
-              <a:t> gezielt identifizieren. </a:t>
-            </a:r>
-          </a:p>
-          <a:p>
-            <a:pPr marL="171450" indent="-171450">
-              <a:lnSpc>
-                <a:spcPts val="1425"/>
-              </a:lnSpc>
-              <a:buFont typeface="Arial" panose="020B0604020202020204" pitchFamily="34" charset="0"/>
-              <a:buChar char="•"/>
-            </a:pPr>
-            <a:endParaRPr lang="de-DE" sz="1200" b="0" dirty="0">
-              <a:effectLst/>
-            </a:endParaRPr>
-          </a:p>
-          <a:p>
-            <a:pPr>
-              <a:lnSpc>
-                <a:spcPts val="1425"/>
-              </a:lnSpc>
-              <a:buNone/>
-            </a:pPr>
-            <a:r>
-              <a:rPr lang="de-DE" sz="1200" b="0" dirty="0">
-                <a:effectLst/>
-              </a:rPr>
-              <a:t>Die farbige Visualisierung im Plot bietet einen schnellen Überblick über die Nutzungsstruktur der wichtigsten Seiten.</a:t>
-            </a:r>
-          </a:p>
-          <a:p>
-            <a:endParaRPr lang="de-DE" dirty="0"/>
+            <a:r>
+              <a:rPr lang="de-DE" sz="1200" b="0" kern="1200" dirty="0">
+                <a:solidFill>
+                  <a:schemeClr val="tx1"/>
+                </a:solidFill>
+                <a:effectLst/>
+                <a:latin typeface="+mn-lt"/>
+                <a:ea typeface="+mn-ea"/>
+                <a:cs typeface="+mn-cs"/>
+              </a:rPr>
+              <a:t>   Es werden die zuvor gebildeten Clusterlabels (z. B. aus „Device-Verhalten“ oder „Engagement-Verhalten“) gruppiert, um zu untersuchen, an welchen Wochentagen diese Nutzergruppen besonders häufig auftreten. Die Häufigkeit wird für jeden Wochentag gezählt und als Balkendiagramm visualisiert.</a:t>
+            </a:r>
+          </a:p>
+          <a:p>
+            <a:br>
+              <a:rPr lang="de-DE" sz="1200" b="0" kern="1200" dirty="0">
+                <a:solidFill>
+                  <a:schemeClr val="tx1"/>
+                </a:solidFill>
+                <a:effectLst/>
+                <a:latin typeface="+mn-lt"/>
+                <a:ea typeface="+mn-ea"/>
+                <a:cs typeface="+mn-cs"/>
+              </a:rPr>
+            </a:br>
+            <a:r>
+              <a:rPr lang="de-DE" sz="1200" b="0" kern="1200" dirty="0">
+                <a:solidFill>
+                  <a:schemeClr val="tx1"/>
+                </a:solidFill>
+                <a:effectLst/>
+                <a:latin typeface="+mn-lt"/>
+                <a:ea typeface="+mn-ea"/>
+                <a:cs typeface="+mn-cs"/>
+              </a:rPr>
+              <a:t>2. </a:t>
+            </a:r>
+            <a:r>
+              <a:rPr lang="de-DE" sz="1200" b="0" kern="1200" dirty="0" err="1">
+                <a:solidFill>
+                  <a:schemeClr val="tx1"/>
+                </a:solidFill>
+                <a:effectLst/>
+                <a:latin typeface="+mn-lt"/>
+                <a:ea typeface="+mn-ea"/>
+                <a:cs typeface="+mn-cs"/>
+              </a:rPr>
+              <a:t>b</a:t>
+            </a:r>
+            <a:r>
+              <a:rPr lang="de-DE" sz="1200" b="1" kern="1200" dirty="0" err="1">
+                <a:solidFill>
+                  <a:schemeClr val="tx1"/>
+                </a:solidFill>
+                <a:effectLst/>
+                <a:latin typeface="+mn-lt"/>
+                <a:ea typeface="+mn-ea"/>
+                <a:cs typeface="+mn-cs"/>
+              </a:rPr>
+              <a:t>Feiertagsanalyse</a:t>
+            </a:r>
+            <a:r>
+              <a:rPr lang="de-DE" sz="1200" b="1" kern="1200" dirty="0">
+                <a:solidFill>
+                  <a:schemeClr val="tx1"/>
+                </a:solidFill>
+                <a:effectLst/>
+                <a:latin typeface="+mn-lt"/>
+                <a:ea typeface="+mn-ea"/>
+                <a:cs typeface="+mn-cs"/>
+              </a:rPr>
+              <a:t> pro Clustergruppe:</a:t>
+            </a:r>
+            <a:r>
+              <a:rPr lang="de-DE" sz="1200" b="0" kern="1200" dirty="0">
+                <a:solidFill>
+                  <a:schemeClr val="tx1"/>
+                </a:solidFill>
+                <a:effectLst/>
+                <a:latin typeface="+mn-lt"/>
+                <a:ea typeface="+mn-ea"/>
+                <a:cs typeface="+mn-cs"/>
+              </a:rPr>
+              <a:t> </a:t>
+            </a:r>
+          </a:p>
+          <a:p>
+            <a:r>
+              <a:rPr lang="de-DE" sz="1200" b="0" kern="1200" dirty="0">
+                <a:solidFill>
+                  <a:schemeClr val="tx1"/>
+                </a:solidFill>
+                <a:effectLst/>
+                <a:latin typeface="+mn-lt"/>
+                <a:ea typeface="+mn-ea"/>
+                <a:cs typeface="+mn-cs"/>
+              </a:rPr>
+              <a:t>   In einem zweiten Schritt wird geprüft, ob sich bestimmte Cluster auch an Feiertagen überproportional zeigen. Dazu wird eine gefilterte Feiertags-Tabelle genutzt, die angibt, wie häufig einzelne Cluster an spezifischen Feiertagen auftreten.</a:t>
+            </a:r>
           </a:p>
         </p:txBody>
       </p:sp>
@@ -992,7 +1141,7 @@
           <a:p>
             <a:fld id="{6D0EAAEC-3026-475C-AE13-EBFCAFEF86C8}" type="slidenum">
               <a:rPr lang="de-DE" smtClean="0"/>
-              <a:t>11</a:t>
+              <a:t>12</a:t>
             </a:fld>
             <a:endParaRPr lang="de-DE"/>
           </a:p>
@@ -1001,7 +1150,7 @@
     </p:spTree>
     <p:extLst>
       <p:ext uri="{BB962C8B-B14F-4D97-AF65-F5344CB8AC3E}">
-        <p14:creationId xmlns:p14="http://schemas.microsoft.com/office/powerpoint/2010/main" val="3368151795"/>
+        <p14:creationId xmlns:p14="http://schemas.microsoft.com/office/powerpoint/2010/main" val="2143588248"/>
       </p:ext>
     </p:extLst>
   </p:cSld>
@@ -1055,117 +1204,155 @@
           <a:bodyPr/>
           <a:lstStyle/>
           <a:p>
-            <a:r>
-              <a:rPr lang="de-DE" sz="1200" b="1" dirty="0"/>
-              <a:t>Interpretation der Cluster</a:t>
-            </a:r>
-          </a:p>
-          <a:p>
-            <a:r>
-              <a:rPr lang="de-DE" sz="1200" dirty="0"/>
-              <a:t>Großer Traffic, geringes Engagement:</a:t>
-            </a:r>
-          </a:p>
-          <a:p>
-            <a:r>
-              <a:rPr lang="de-DE" sz="1200" dirty="0"/>
-              <a:t>Quellen mit vielen Sitzungen, aber eher wenigen Seitenaufrufen pro Besuch (z. B. „</a:t>
-            </a:r>
-            <a:r>
-              <a:rPr lang="de-DE" sz="1200" dirty="0" err="1"/>
-              <a:t>google</a:t>
-            </a:r>
-            <a:r>
-              <a:rPr lang="de-DE" sz="1200" dirty="0"/>
-              <a:t>“).</a:t>
-            </a:r>
-          </a:p>
-          <a:p>
+            <a:pPr>
+              <a:lnSpc>
+                <a:spcPts val="1425"/>
+              </a:lnSpc>
+              <a:buNone/>
+            </a:pPr>
+            <a:r>
+              <a:rPr lang="de-DE" sz="1200" b="0" dirty="0">
+                <a:effectLst/>
+              </a:rPr>
+              <a:t>Für die Analyse wurden die 15 meistbesuchten Seiten betrachtet. Jede Seite wurde einem Cluster zugeordnet, um die Nutzungsintensität zu kategorisieren. Die genaue Verteilung der Seiten auf die Cluster hängt vom Ergebnis der Clusteranalyse ab und kann variieren.</a:t>
+            </a:r>
+          </a:p>
+          <a:p>
+            <a:pPr>
+              <a:lnSpc>
+                <a:spcPts val="1425"/>
+              </a:lnSpc>
+              <a:buNone/>
+            </a:pPr>
+            <a:endParaRPr lang="de-DE" sz="1200" b="0" dirty="0">
+              <a:effectLst/>
+            </a:endParaRPr>
+          </a:p>
+          <a:p>
+            <a:pPr>
+              <a:lnSpc>
+                <a:spcPts val="1425"/>
+              </a:lnSpc>
+              <a:buNone/>
+            </a:pPr>
+            <a:br>
+              <a:rPr lang="de-DE" sz="1200" b="0" dirty="0">
+                <a:effectLst/>
+              </a:rPr>
+            </a:br>
+            <a:r>
+              <a:rPr lang="de-DE" sz="1200" b="1" dirty="0">
+                <a:effectLst/>
+              </a:rPr>
+              <a:t>Warum ist das nützlich?</a:t>
+            </a:r>
             <a:endParaRPr lang="de-DE" sz="1200" dirty="0"/>
           </a:p>
           <a:p>
-            <a:r>
-              <a:rPr lang="de-DE" sz="1200" dirty="0"/>
-              <a:t>Mittlerer Traffic, hohes Engagement:</a:t>
-            </a:r>
-          </a:p>
-          <a:p>
-            <a:r>
-              <a:rPr lang="de-DE" sz="1200" dirty="0"/>
-              <a:t>Quellen mit weniger Besuchen als Cluster 1, aber viel mehr Seitenaufrufen pro Sitzung (z. B. „</a:t>
-            </a:r>
-            <a:r>
-              <a:rPr lang="de-DE" sz="1200" dirty="0" err="1"/>
-              <a:t>direct</a:t>
-            </a:r>
-            <a:r>
-              <a:rPr lang="de-DE" sz="1200" dirty="0"/>
-              <a:t>“).</a:t>
-            </a:r>
-          </a:p>
-          <a:p>
-            <a:endParaRPr lang="de-DE" sz="1200" dirty="0"/>
-          </a:p>
-          <a:p>
-            <a:r>
-              <a:rPr lang="de-DE" sz="1200" dirty="0"/>
-              <a:t>Kleiner Traffic, moderates Engagement:</a:t>
-            </a:r>
-          </a:p>
-          <a:p>
-            <a:r>
-              <a:rPr lang="de-DE" sz="1200" dirty="0"/>
-              <a:t>Quellen mit wenig Traffic und moderaten Seitenaufrufen pro Sitzung (z. B. „Andere“, „kompetenznetz-einsamkeit.de“).</a:t>
-            </a:r>
-          </a:p>
-          <a:p>
-            <a:endParaRPr lang="de-DE" sz="1200" b="1" dirty="0"/>
-          </a:p>
-          <a:p>
-            <a:r>
-              <a:rPr lang="de-DE" sz="1200" b="1" dirty="0"/>
-              <a:t>Fazit</a:t>
-            </a:r>
-          </a:p>
-          <a:p>
-            <a:r>
-              <a:rPr lang="de-DE" sz="1200" dirty="0"/>
-              <a:t>Diese Clustering-Analyse hilft, die Besucherquellen besser zu verstehen und gezielt Prioritäten zu setzen:</a:t>
-            </a:r>
-          </a:p>
-          <a:p>
-            <a:endParaRPr lang="de-DE" sz="1200" dirty="0"/>
-          </a:p>
-          <a:p>
-            <a:r>
-              <a:rPr lang="de-DE" sz="1200" dirty="0"/>
-              <a:t>Große Traffic-Quellen wie „</a:t>
-            </a:r>
-            <a:r>
-              <a:rPr lang="de-DE" sz="1200" dirty="0" err="1"/>
-              <a:t>google</a:t>
-            </a:r>
-            <a:r>
-              <a:rPr lang="de-DE" sz="1200" dirty="0"/>
-              <a:t>“ brauchen Maßnahmen, um das Engagement zu erhöhen.</a:t>
-            </a:r>
-          </a:p>
-          <a:p>
-            <a:endParaRPr lang="de-DE" sz="1200" dirty="0"/>
-          </a:p>
-          <a:p>
-            <a:r>
-              <a:rPr lang="de-DE" sz="1200" dirty="0"/>
-              <a:t>Direktzugriffe sind sehr engagiert, hier lohnt sich eine Pflege der Inhalte.</a:t>
-            </a:r>
-          </a:p>
-          <a:p>
-            <a:endParaRPr lang="de-DE" sz="1200" dirty="0"/>
-          </a:p>
-          <a:p>
-            <a:r>
-              <a:rPr lang="de-DE" sz="1200" dirty="0"/>
-              <a:t>Andere Quellen sollten weiter beobachtet werden, da sie zwar kleiner sind, aber dennoch wertvolles Engagement liefern können.</a:t>
+            <a:pPr>
+              <a:lnSpc>
+                <a:spcPts val="1425"/>
+              </a:lnSpc>
+              <a:buNone/>
+            </a:pPr>
+            <a:br>
+              <a:rPr lang="de-DE" sz="1200" b="0" dirty="0">
+                <a:effectLst/>
+              </a:rPr>
+            </a:br>
+            <a:r>
+              <a:rPr lang="de-DE" sz="1200" b="0" dirty="0">
+                <a:effectLst/>
+              </a:rPr>
+              <a:t>Die </a:t>
+            </a:r>
+            <a:r>
+              <a:rPr lang="de-DE" sz="1200" b="1" dirty="0">
+                <a:effectLst/>
+              </a:rPr>
+              <a:t>Cluster helfen dabei, Landingpages nach Nutzungsintensität zu gruppieren</a:t>
+            </a:r>
+            <a:r>
+              <a:rPr lang="de-DE" sz="1200" b="0" dirty="0">
+                <a:effectLst/>
+              </a:rPr>
+              <a:t>, ohne dass man feste Schwellenwerte definieren muss.</a:t>
+            </a:r>
+          </a:p>
+          <a:p>
+            <a:pPr>
+              <a:lnSpc>
+                <a:spcPts val="1425"/>
+              </a:lnSpc>
+              <a:buNone/>
+            </a:pPr>
+            <a:endParaRPr lang="de-DE" sz="1200" b="0" dirty="0">
+              <a:effectLst/>
+            </a:endParaRPr>
+          </a:p>
+          <a:p>
+            <a:pPr marL="0" indent="0">
+              <a:lnSpc>
+                <a:spcPts val="1425"/>
+              </a:lnSpc>
+              <a:buFont typeface="Arial" panose="020B0604020202020204" pitchFamily="34" charset="0"/>
+              <a:buNone/>
+            </a:pPr>
+            <a:r>
+              <a:rPr lang="de-DE" sz="1200" b="0" dirty="0">
+                <a:effectLst/>
+              </a:rPr>
+              <a:t>So lassen sich beispielsweise Seiten mit </a:t>
+            </a:r>
+            <a:r>
+              <a:rPr lang="de-DE" sz="1200" b="1" dirty="0">
+                <a:effectLst/>
+              </a:rPr>
+              <a:t>Optimierungspotenzial</a:t>
+            </a:r>
+            <a:r>
+              <a:rPr lang="de-DE" sz="1200" b="0" dirty="0">
+                <a:effectLst/>
+              </a:rPr>
+              <a:t> oder solche mit </a:t>
+            </a:r>
+            <a:r>
+              <a:rPr lang="de-DE" sz="1200" b="1" dirty="0">
+                <a:effectLst/>
+              </a:rPr>
+              <a:t>besonders hoher Sichtbarkeit</a:t>
+            </a:r>
+            <a:r>
+              <a:rPr lang="de-DE" sz="1200" b="0" dirty="0">
+                <a:effectLst/>
+              </a:rPr>
+              <a:t> gezielt identifizieren. </a:t>
+            </a:r>
+          </a:p>
+          <a:p>
+            <a:pPr marL="171450" indent="-171450">
+              <a:lnSpc>
+                <a:spcPts val="1425"/>
+              </a:lnSpc>
+              <a:buFont typeface="Arial" panose="020B0604020202020204" pitchFamily="34" charset="0"/>
+              <a:buChar char="•"/>
+            </a:pPr>
+            <a:endParaRPr lang="de-DE" sz="1200" b="0" dirty="0">
+              <a:effectLst/>
+            </a:endParaRPr>
+          </a:p>
+          <a:p>
+            <a:pPr>
+              <a:lnSpc>
+                <a:spcPts val="1425"/>
+              </a:lnSpc>
+              <a:buNone/>
+            </a:pPr>
+            <a:r>
+              <a:rPr lang="de-DE" sz="1200" b="0" dirty="0">
+                <a:effectLst/>
+              </a:rPr>
+              <a:t>Die farbige Visualisierung im Plot bietet einen schnellen Überblick über die Nutzungsstruktur der wichtigsten Seiten.</a:t>
             </a:r>
           </a:p>
           <a:p>
@@ -1190,7 +1377,7 @@
           <a:p>
             <a:fld id="{6D0EAAEC-3026-475C-AE13-EBFCAFEF86C8}" type="slidenum">
               <a:rPr lang="de-DE" smtClean="0"/>
-              <a:t>12</a:t>
+              <a:t>13</a:t>
             </a:fld>
             <a:endParaRPr lang="de-DE"/>
           </a:p>
@@ -1199,7 +1386,7 @@
     </p:spTree>
     <p:extLst>
       <p:ext uri="{BB962C8B-B14F-4D97-AF65-F5344CB8AC3E}">
-        <p14:creationId xmlns:p14="http://schemas.microsoft.com/office/powerpoint/2010/main" val="2310381196"/>
+        <p14:creationId xmlns:p14="http://schemas.microsoft.com/office/powerpoint/2010/main" val="3368151795"/>
       </p:ext>
     </p:extLst>
   </p:cSld>
@@ -1255,191 +1442,115 @@
           <a:p>
             <a:r>
               <a:rPr lang="de-DE" sz="1200" b="1" dirty="0"/>
-              <a:t>Beobachtungen:</a:t>
-            </a:r>
+              <a:t>Interpretation der Cluster</a:t>
+            </a:r>
+          </a:p>
+          <a:p>
+            <a:r>
+              <a:rPr lang="de-DE" sz="1200" dirty="0"/>
+              <a:t>Großer Traffic, geringes Engagement:</a:t>
+            </a:r>
+          </a:p>
+          <a:p>
+            <a:r>
+              <a:rPr lang="de-DE" sz="1200" dirty="0"/>
+              <a:t>Quellen mit vielen Sitzungen, aber eher wenigen Seitenaufrufen pro Besuch (z. B. „</a:t>
+            </a:r>
+            <a:r>
+              <a:rPr lang="de-DE" sz="1200" dirty="0" err="1"/>
+              <a:t>google</a:t>
+            </a:r>
+            <a:r>
+              <a:rPr lang="de-DE" sz="1200" dirty="0"/>
+              <a:t>“).</a:t>
+            </a:r>
+          </a:p>
+          <a:p>
             <a:endParaRPr lang="de-DE" sz="1200" dirty="0"/>
           </a:p>
           <a:p>
             <a:r>
               <a:rPr lang="de-DE" sz="1200" dirty="0"/>
-              <a:t>- </a:t>
-            </a:r>
+              <a:t>Mittlerer Traffic, hohes Engagement:</a:t>
+            </a:r>
+          </a:p>
+          <a:p>
+            <a:r>
+              <a:rPr lang="de-DE" sz="1200" dirty="0"/>
+              <a:t>Quellen mit weniger Besuchen als Cluster 1, aber viel mehr Seitenaufrufen pro Sitzung (z. B. „</a:t>
+            </a:r>
+            <a:r>
+              <a:rPr lang="de-DE" sz="1200" dirty="0" err="1"/>
+              <a:t>direct</a:t>
+            </a:r>
+            <a:r>
+              <a:rPr lang="de-DE" sz="1200" dirty="0"/>
+              <a:t>“).</a:t>
+            </a:r>
+          </a:p>
+          <a:p>
+            <a:endParaRPr lang="de-DE" sz="1200" dirty="0"/>
+          </a:p>
+          <a:p>
+            <a:r>
+              <a:rPr lang="de-DE" sz="1200" dirty="0"/>
+              <a:t>Kleiner Traffic, moderates Engagement:</a:t>
+            </a:r>
+          </a:p>
+          <a:p>
+            <a:r>
+              <a:rPr lang="de-DE" sz="1200" dirty="0"/>
+              <a:t>Quellen mit wenig Traffic und moderaten Seitenaufrufen pro Sitzung (z. B. „Andere“, „kompetenznetz-einsamkeit.de“).</a:t>
+            </a:r>
+          </a:p>
+          <a:p>
+            <a:endParaRPr lang="de-DE" sz="1200" b="1" dirty="0"/>
+          </a:p>
+          <a:p>
             <a:r>
               <a:rPr lang="de-DE" sz="1200" b="1" dirty="0"/>
-              <a:t>„</a:t>
-            </a:r>
-            <a:r>
-              <a:rPr lang="de-DE" sz="1200" b="1" dirty="0" err="1"/>
-              <a:t>Checked</a:t>
-            </a:r>
-            <a:r>
-              <a:rPr lang="de-DE" sz="1200" b="1" dirty="0"/>
-              <a:t>“</a:t>
-            </a:r>
+              <a:t>Fazit</a:t>
+            </a:r>
+          </a:p>
+          <a:p>
             <a:r>
               <a:rPr lang="de-DE" sz="1200" dirty="0"/>
-              <a:t> ist mit Abstand das häufigste Event – vermutlich ausgelöst durch das Öffnendes Filters der Redner auf der Website</a:t>
-            </a:r>
+              <a:t>Diese Clustering-Analyse hilft, die Besucherquellen besser zu verstehen und gezielt Prioritäten zu setzen:</a:t>
+            </a:r>
+          </a:p>
+          <a:p>
+            <a:endParaRPr lang="de-DE" sz="1200" dirty="0"/>
           </a:p>
           <a:p>
             <a:r>
               <a:rPr lang="de-DE" sz="1200" dirty="0"/>
-              <a:t>- </a:t>
-            </a:r>
-            <a:r>
-              <a:rPr lang="de-DE" sz="1200" b="1" dirty="0"/>
-              <a:t>„Website“, „Email“ und „Phone“</a:t>
+              <a:t>Große Traffic-Quellen wie „</a:t>
+            </a:r>
+            <a:r>
+              <a:rPr lang="de-DE" sz="1200" dirty="0" err="1"/>
+              <a:t>google</a:t>
             </a:r>
             <a:r>
               <a:rPr lang="de-DE" sz="1200" dirty="0"/>
-              <a:t> sind </a:t>
-            </a:r>
-            <a:r>
-              <a:rPr lang="de-DE" sz="1200"/>
-              <a:t>Kontaktwege. Diese </a:t>
-            </a:r>
+              <a:t>“ brauchen Maßnahmen, um das Engagement zu erhöhen.</a:t>
+            </a:r>
+          </a:p>
+          <a:p>
+            <a:endParaRPr lang="de-DE" sz="1200" dirty="0"/>
+          </a:p>
+          <a:p>
             <a:r>
               <a:rPr lang="de-DE" sz="1200" dirty="0"/>
-              <a:t>Events lassen sich als konkrete </a:t>
-            </a:r>
-            <a:r>
-              <a:rPr lang="de-DE" sz="1200" dirty="0" err="1"/>
-              <a:t>Conversion</a:t>
-            </a:r>
+              <a:t>Direktzugriffe sind sehr engagiert, hier lohnt sich eine Pflege der Inhalte.</a:t>
+            </a:r>
+          </a:p>
+          <a:p>
+            <a:endParaRPr lang="de-DE" sz="1200" dirty="0"/>
+          </a:p>
+          <a:p>
             <a:r>
               <a:rPr lang="de-DE" sz="1200" dirty="0"/>
-              <a:t>-Schritte interpretieren.</a:t>
-            </a:r>
-          </a:p>
-          <a:p>
-            <a:r>
-              <a:rPr lang="de-DE" sz="1200" dirty="0"/>
-              <a:t>- </a:t>
-            </a:r>
-            <a:r>
-              <a:rPr lang="de-DE" sz="1200" b="1" dirty="0"/>
-              <a:t>„Image“</a:t>
-            </a:r>
-            <a:r>
-              <a:rPr lang="de-DE" sz="1200" dirty="0"/>
-              <a:t> ist kaum relevant und wird selten genutzt.</a:t>
-            </a:r>
-          </a:p>
-          <a:p>
-            <a:br>
-              <a:rPr lang="de-DE" sz="1200" dirty="0"/>
-            </a:br>
-            <a:r>
-              <a:rPr lang="de-DE" sz="1200" b="1" dirty="0"/>
-              <a:t>Was lässt sich daraus ableiten?</a:t>
-            </a:r>
-            <a:endParaRPr lang="de-DE" sz="1200" dirty="0"/>
-          </a:p>
-          <a:p>
-            <a:br>
-              <a:rPr lang="de-DE" sz="1200" dirty="0"/>
-            </a:br>
-            <a:r>
-              <a:rPr lang="de-DE" sz="1200" dirty="0"/>
-              <a:t>- </a:t>
-            </a:r>
-            <a:r>
-              <a:rPr lang="de-DE" sz="1200" b="1" dirty="0"/>
-              <a:t>Starke Initialinteraktion:</a:t>
-            </a:r>
-            <a:r>
-              <a:rPr lang="de-DE" sz="1200" dirty="0"/>
-              <a:t>  </a:t>
-            </a:r>
-          </a:p>
-          <a:p>
-            <a:r>
-              <a:rPr lang="de-DE" sz="1200" dirty="0"/>
-              <a:t>  Die Nutzer zeigen hohes Interesse beim „Durchklicken“ – das ist ein positives Zeichen für Relevanz und Usability der Einstiegselemente.</a:t>
-            </a:r>
-          </a:p>
-          <a:p>
-            <a:br>
-              <a:rPr lang="de-DE" sz="1200" dirty="0"/>
-            </a:br>
-            <a:r>
-              <a:rPr lang="de-DE" sz="1200" dirty="0"/>
-              <a:t>- </a:t>
-            </a:r>
-            <a:r>
-              <a:rPr lang="de-DE" sz="1200" b="1" dirty="0"/>
-              <a:t>Konversion messbar:</a:t>
-            </a:r>
-            <a:endParaRPr lang="de-DE" sz="1200" dirty="0"/>
-          </a:p>
-          <a:p>
-            <a:r>
-              <a:rPr lang="de-DE" sz="1200" dirty="0"/>
-              <a:t>  Der Rückgang von „</a:t>
-            </a:r>
-            <a:r>
-              <a:rPr lang="de-DE" sz="1200" dirty="0" err="1"/>
-              <a:t>Checked</a:t>
-            </a:r>
-            <a:r>
-              <a:rPr lang="de-DE" sz="1200" dirty="0"/>
-              <a:t>“ (12.828 Nutzer) zu „Email“ (2.961) oder „Phone“ (1.137) ist typisch – zeigt aber auch, dass viele den letzten Schritt </a:t>
-            </a:r>
-            <a:r>
-              <a:rPr lang="de-DE" sz="1200" b="1" dirty="0"/>
-              <a:t>nicht gehen</a:t>
-            </a:r>
-            <a:r>
-              <a:rPr lang="de-DE" sz="1200" dirty="0"/>
-              <a:t>. Gründe könnten Unsicherheit, fehlendes Vertrauen oder ein zu weiter Weg zur Kontaktaufnahme sein.</a:t>
-            </a:r>
-          </a:p>
-          <a:p>
-            <a:br>
-              <a:rPr lang="de-DE" sz="1200" dirty="0"/>
-            </a:br>
-            <a:r>
-              <a:rPr lang="de-DE" sz="1200" dirty="0"/>
-              <a:t>- </a:t>
-            </a:r>
-            <a:r>
-              <a:rPr lang="de-DE" sz="1200" b="1" dirty="0"/>
-              <a:t>Optimierungspotenziale:</a:t>
-            </a:r>
-            <a:endParaRPr lang="de-DE" sz="1200" dirty="0"/>
-          </a:p>
-          <a:p>
-            <a:r>
-              <a:rPr lang="de-DE" sz="1200" dirty="0"/>
-              <a:t>  - CTA-Buttons prominenter platzieren oder besser beschriften („Jetzt anonym Kontakt aufnehmen“).</a:t>
-            </a:r>
-          </a:p>
-          <a:p>
-            <a:r>
-              <a:rPr lang="de-DE" sz="1200" dirty="0"/>
-              <a:t>  - Direkt nach „</a:t>
-            </a:r>
-            <a:r>
-              <a:rPr lang="de-DE" sz="1200" dirty="0" err="1"/>
-              <a:t>Checked</a:t>
-            </a:r>
-            <a:r>
-              <a:rPr lang="de-DE" sz="1200" dirty="0"/>
-              <a:t>“-Aktionen gezielte Call-</a:t>
-            </a:r>
-            <a:r>
-              <a:rPr lang="de-DE" sz="1200" dirty="0" err="1"/>
-              <a:t>to</a:t>
-            </a:r>
-            <a:r>
-              <a:rPr lang="de-DE" sz="1200" dirty="0"/>
-              <a:t>-Action-Einblendungen testen.</a:t>
-            </a:r>
-          </a:p>
-          <a:p>
-            <a:r>
-              <a:rPr lang="de-DE" sz="1200" dirty="0"/>
-              <a:t>  - Vertrauen aufbauen durch Testimonials oder klare Information zur Kontaktaufnahme (z. B. Datenschutz, Anonymität).</a:t>
+              <a:t>Andere Quellen sollten weiter beobachtet werden, da sie zwar kleiner sind, aber dennoch wertvolles Engagement liefern können.</a:t>
             </a:r>
           </a:p>
           <a:p>
@@ -1464,7 +1575,7 @@
           <a:p>
             <a:fld id="{6D0EAAEC-3026-475C-AE13-EBFCAFEF86C8}" type="slidenum">
               <a:rPr lang="de-DE" smtClean="0"/>
-              <a:t>13</a:t>
+              <a:t>14</a:t>
             </a:fld>
             <a:endParaRPr lang="de-DE"/>
           </a:p>
@@ -1473,7 +1584,7 @@
     </p:spTree>
     <p:extLst>
       <p:ext uri="{BB962C8B-B14F-4D97-AF65-F5344CB8AC3E}">
-        <p14:creationId xmlns:p14="http://schemas.microsoft.com/office/powerpoint/2010/main" val="184461416"/>
+        <p14:creationId xmlns:p14="http://schemas.microsoft.com/office/powerpoint/2010/main" val="2310381196"/>
       </p:ext>
     </p:extLst>
   </p:cSld>
@@ -1529,63 +1640,107 @@
           <a:p>
             <a:r>
               <a:rPr lang="de-DE" sz="1200" b="1" dirty="0"/>
-              <a:t>Interpretation der Ergebnisse</a:t>
+              <a:t>Beobachtungen:</a:t>
             </a:r>
             <a:endParaRPr lang="de-DE" sz="1200" dirty="0"/>
+          </a:p>
+          <a:p>
+            <a:r>
+              <a:rPr lang="de-DE" sz="1200" dirty="0"/>
+              <a:t>- </a:t>
+            </a:r>
+            <a:r>
+              <a:rPr lang="de-DE" sz="1200" b="1" dirty="0"/>
+              <a:t>„</a:t>
+            </a:r>
+            <a:r>
+              <a:rPr lang="de-DE" sz="1200" b="1" dirty="0" err="1"/>
+              <a:t>Checked</a:t>
+            </a:r>
+            <a:r>
+              <a:rPr lang="de-DE" sz="1200" b="1" dirty="0"/>
+              <a:t>“</a:t>
+            </a:r>
+            <a:r>
+              <a:rPr lang="de-DE" sz="1200" dirty="0"/>
+              <a:t> ist mit Abstand das häufigste Event – vermutlich ausgelöst durch das Öffnendes Filters der Redner auf der Website</a:t>
+            </a:r>
+          </a:p>
+          <a:p>
+            <a:r>
+              <a:rPr lang="de-DE" sz="1200" dirty="0"/>
+              <a:t>- </a:t>
+            </a:r>
+            <a:r>
+              <a:rPr lang="de-DE" sz="1200" b="1" dirty="0"/>
+              <a:t>„Website“, „Email“ und „Phone“</a:t>
+            </a:r>
+            <a:r>
+              <a:rPr lang="de-DE" sz="1200" dirty="0"/>
+              <a:t> sind </a:t>
+            </a:r>
+            <a:r>
+              <a:rPr lang="de-DE" sz="1200"/>
+              <a:t>Kontaktwege. Diese </a:t>
+            </a:r>
+            <a:r>
+              <a:rPr lang="de-DE" sz="1200" dirty="0"/>
+              <a:t>Events lassen sich als konkrete </a:t>
+            </a:r>
+            <a:r>
+              <a:rPr lang="de-DE" sz="1200" dirty="0" err="1"/>
+              <a:t>Conversion</a:t>
+            </a:r>
+            <a:r>
+              <a:rPr lang="de-DE" sz="1200" dirty="0"/>
+              <a:t>-Schritte interpretieren.</a:t>
+            </a:r>
+          </a:p>
+          <a:p>
+            <a:r>
+              <a:rPr lang="de-DE" sz="1200" dirty="0"/>
+              <a:t>- </a:t>
+            </a:r>
+            <a:r>
+              <a:rPr lang="de-DE" sz="1200" b="1" dirty="0"/>
+              <a:t>„Image“</a:t>
+            </a:r>
+            <a:r>
+              <a:rPr lang="de-DE" sz="1200" dirty="0"/>
+              <a:t> ist kaum relevant und wird selten genutzt.</a:t>
+            </a:r>
           </a:p>
           <a:p>
             <a:br>
               <a:rPr lang="de-DE" sz="1200" dirty="0"/>
             </a:br>
+            <a:r>
+              <a:rPr lang="de-DE" sz="1200" b="1" dirty="0"/>
+              <a:t>Was lässt sich daraus ableiten?</a:t>
+            </a:r>
+            <a:endParaRPr lang="de-DE" sz="1200" dirty="0"/>
+          </a:p>
+          <a:p>
             <a:br>
               <a:rPr lang="de-DE" sz="1200" dirty="0"/>
             </a:br>
             <a:r>
+              <a:rPr lang="de-DE" sz="1200" dirty="0"/>
+              <a:t>- </a:t>
+            </a:r>
+            <a:r>
               <a:rPr lang="de-DE" sz="1200" b="1" dirty="0"/>
-              <a:t>Auffällig:</a:t>
-            </a:r>
-            <a:endParaRPr lang="de-DE" sz="1200" dirty="0"/>
-          </a:p>
-          <a:p>
+              <a:t>Starke Initialinteraktion:</a:t>
+            </a:r>
             <a:r>
               <a:rPr lang="de-DE" sz="1200" dirty="0"/>
-              <a:t>- Die Seite „Ich brauche Redezeit“ generiert </a:t>
-            </a:r>
-            <a:r>
-              <a:rPr lang="de-DE" sz="1200" b="1" dirty="0"/>
-              <a:t>extrem viele Aufrufe</a:t>
-            </a:r>
+              <a:t>  </a:t>
+            </a:r>
+          </a:p>
+          <a:p>
             <a:r>
               <a:rPr lang="de-DE" sz="1200" dirty="0"/>
-              <a:t> über mehrere Quellen – besonders Google und Direktzugriffe.</a:t>
-            </a:r>
-          </a:p>
-          <a:p>
-            <a:r>
-              <a:rPr lang="de-DE" sz="1200" dirty="0"/>
-              <a:t>- Die </a:t>
-            </a:r>
-            <a:r>
-              <a:rPr lang="de-DE" sz="1200" b="1" dirty="0"/>
-              <a:t>Verweildauer liegt stabil bei ca. 97 Sekunden</a:t>
-            </a:r>
-            <a:r>
-              <a:rPr lang="de-DE" sz="1200" dirty="0"/>
-              <a:t>, was ein gutes Engagement signalisiert.</a:t>
-            </a:r>
-          </a:p>
-          <a:p>
-            <a:r>
-              <a:rPr lang="de-DE" sz="1200" dirty="0"/>
-              <a:t>- Die </a:t>
-            </a:r>
-            <a:r>
-              <a:rPr lang="de-DE" sz="1200" b="1" dirty="0"/>
-              <a:t>Absprungrate bleibt unter 30 %</a:t>
-            </a:r>
-            <a:r>
-              <a:rPr lang="de-DE" sz="1200" dirty="0"/>
-              <a:t>, was für Landingpages ein sehr positiver Wert ist.</a:t>
+              <a:t>  Die Nutzer zeigen hohes Interesse beim „Durchklicken“ – das ist ein positives Zeichen für Relevanz und Usability der Einstiegselemente.</a:t>
             </a:r>
           </a:p>
           <a:p>
@@ -1594,26 +1749,35 @@
             </a:br>
             <a:r>
               <a:rPr lang="de-DE" sz="1200" dirty="0"/>
-              <a:t>Am Ende der Tabelle erscheinen Seiten mit </a:t>
+              <a:t>- </a:t>
             </a:r>
             <a:r>
               <a:rPr lang="de-DE" sz="1200" b="1" dirty="0"/>
-              <a:t>0 Aufrufen</a:t>
-            </a:r>
+              <a:t>Konversion messbar:</a:t>
+            </a:r>
+            <a:endParaRPr lang="de-DE" sz="1200" dirty="0"/>
+          </a:p>
+          <a:p>
             <a:r>
               <a:rPr lang="de-DE" sz="1200" dirty="0"/>
-              <a:t>, was meist durch technische Gründe oder irrelevante Inhalte erklärt werden kann.</a:t>
-            </a:r>
-          </a:p>
-          <a:p>
-            <a:endParaRPr lang="de-DE" sz="1200" dirty="0"/>
-          </a:p>
-          <a:p>
+              <a:t>  Der Rückgang von „</a:t>
+            </a:r>
+            <a:r>
+              <a:rPr lang="de-DE" sz="1200" dirty="0" err="1"/>
+              <a:t>Checked</a:t>
+            </a:r>
+            <a:r>
+              <a:rPr lang="de-DE" sz="1200" dirty="0"/>
+              <a:t>“ (12.828 Nutzer) zu „Email“ (2.961) oder „Phone“ (1.137) ist typisch – zeigt aber auch, dass viele den letzten Schritt </a:t>
+            </a:r>
             <a:r>
               <a:rPr lang="de-DE" sz="1200" b="1" dirty="0"/>
-              <a:t>Was lässt sich daraus ableiten?</a:t>
-            </a:r>
-            <a:endParaRPr lang="de-DE" sz="1200" dirty="0"/>
+              <a:t>nicht gehen</a:t>
+            </a:r>
+            <a:r>
+              <a:rPr lang="de-DE" sz="1200" dirty="0"/>
+              <a:t>. Gründe könnten Unsicherheit, fehlendes Vertrauen oder ein zu weiter Weg zur Kontaktaufnahme sein.</a:t>
+            </a:r>
           </a:p>
           <a:p>
             <a:br>
@@ -1625,102 +1789,43 @@
             </a:r>
             <a:r>
               <a:rPr lang="de-DE" sz="1200" b="1" dirty="0"/>
-              <a:t>Top-</a:t>
-            </a:r>
-            <a:r>
-              <a:rPr lang="de-DE" sz="1200" b="1" dirty="0" err="1"/>
-              <a:t>performing</a:t>
-            </a:r>
-            <a:r>
-              <a:rPr lang="de-DE" sz="1200" b="1" dirty="0"/>
-              <a:t> Inhalte identifizieren:</a:t>
+              <a:t>Optimierungspotenziale:</a:t>
             </a:r>
             <a:endParaRPr lang="de-DE" sz="1200" dirty="0"/>
           </a:p>
           <a:p>
             <a:r>
               <a:rPr lang="de-DE" sz="1200" dirty="0"/>
-              <a:t>  Die Seite „Ich brauche Redezeit“ ist sowohl bei organischer als auch direkter Quelle </a:t>
-            </a:r>
-            <a:r>
-              <a:rPr lang="de-DE" sz="1200" b="1" dirty="0"/>
-              <a:t>hochgradig relevant</a:t>
-            </a:r>
+              <a:t>  - CTA-Buttons prominenter platzieren oder besser beschriften („Jetzt anonym Kontakt aufnehmen“).</a:t>
+            </a:r>
+          </a:p>
+          <a:p>
             <a:r>
               <a:rPr lang="de-DE" sz="1200" dirty="0"/>
-              <a:t> – sie sollte zentrales Element in SEO, Werbung und Startseite sein.</a:t>
-            </a:r>
-          </a:p>
-          <a:p>
-            <a:br>
+              <a:t>  - Direkt nach „</a:t>
+            </a:r>
+            <a:r>
+              <a:rPr lang="de-DE" sz="1200" dirty="0" err="1"/>
+              <a:t>Checked</a:t>
+            </a:r>
+            <a:r>
               <a:rPr lang="de-DE" sz="1200" dirty="0"/>
-            </a:br>
+              <a:t>“-Aktionen gezielte Call-</a:t>
+            </a:r>
+            <a:r>
+              <a:rPr lang="de-DE" sz="1200" dirty="0" err="1"/>
+              <a:t>to</a:t>
+            </a:r>
             <a:r>
               <a:rPr lang="de-DE" sz="1200" dirty="0"/>
-              <a:t>- </a:t>
-            </a:r>
-            <a:r>
-              <a:rPr lang="de-DE" sz="1200" b="1" dirty="0"/>
-              <a:t>Quellenbewertung möglich:</a:t>
-            </a:r>
-            <a:endParaRPr lang="de-DE" sz="1200" dirty="0"/>
+              <a:t>-Action-Einblendungen testen.</a:t>
+            </a:r>
           </a:p>
           <a:p>
             <a:r>
               <a:rPr lang="de-DE" sz="1200" dirty="0"/>
-              <a:t>  Wenn bestimmte Seiten </a:t>
-            </a:r>
-            <a:r>
-              <a:rPr lang="de-DE" sz="1200" b="1" dirty="0"/>
-              <a:t>**nur über einzelne Quellen</a:t>
-            </a:r>
-            <a:r>
-              <a:rPr lang="de-DE" sz="1200" dirty="0"/>
-              <a:t> erfolgreich sind, kann man gezielt z. B. Google Ads verstärken oder Kooperationen mit verlinkenden Seiten ausbauen.</a:t>
-            </a:r>
-          </a:p>
-          <a:p>
-            <a:br>
-              <a:rPr lang="de-DE" sz="1200" dirty="0"/>
-            </a:br>
-            <a:r>
-              <a:rPr lang="de-DE" sz="1200" dirty="0"/>
-              <a:t>- </a:t>
-            </a:r>
-            <a:r>
-              <a:rPr lang="de-DE" sz="1200" b="1" dirty="0"/>
-              <a:t>Niedrige Absprungraten**</a:t>
-            </a:r>
-            <a:r>
-              <a:rPr lang="de-DE" sz="1200" dirty="0"/>
-              <a:t> deuten auf einen funktionierenden ersten Eindruck hin – diese Seiten sind gut optimiert.</a:t>
-            </a:r>
-          </a:p>
-          <a:p>
-            <a:br>
-              <a:rPr lang="de-DE" sz="1200" dirty="0"/>
-            </a:br>
-            <a:r>
-              <a:rPr lang="de-DE" sz="1200" dirty="0"/>
-              <a:t>- </a:t>
-            </a:r>
-            <a:r>
-              <a:rPr lang="de-DE" sz="1200" b="1" dirty="0"/>
-              <a:t>Handlungsbedarf bei Seiten mit 0 Aufrufen oder hoher Absprungrate:</a:t>
-            </a:r>
-            <a:r>
-              <a:rPr lang="de-DE" sz="1200" dirty="0"/>
-              <a:t>  </a:t>
-            </a:r>
-          </a:p>
-          <a:p>
-            <a:r>
-              <a:rPr lang="de-DE" sz="1200" dirty="0"/>
-              <a:t>  Diese Seiten sollten hinsichtlich Sichtbarkeit, Relevanz oder technischer Funktion geprüft werden.</a:t>
-            </a:r>
-          </a:p>
-          <a:p>
-            <a:endParaRPr lang="de-DE" sz="1200" dirty="0"/>
+              <a:t>  - Vertrauen aufbauen durch Testimonials oder klare Information zur Kontaktaufnahme (z. B. Datenschutz, Anonymität).</a:t>
+            </a:r>
           </a:p>
           <a:p>
             <a:endParaRPr lang="de-DE" dirty="0"/>
@@ -1744,7 +1849,7 @@
           <a:p>
             <a:fld id="{6D0EAAEC-3026-475C-AE13-EBFCAFEF86C8}" type="slidenum">
               <a:rPr lang="de-DE" smtClean="0"/>
-              <a:t>14</a:t>
+              <a:t>15</a:t>
             </a:fld>
             <a:endParaRPr lang="de-DE"/>
           </a:p>
@@ -1753,7 +1858,7 @@
     </p:spTree>
     <p:extLst>
       <p:ext uri="{BB962C8B-B14F-4D97-AF65-F5344CB8AC3E}">
-        <p14:creationId xmlns:p14="http://schemas.microsoft.com/office/powerpoint/2010/main" val="2444359810"/>
+        <p14:creationId xmlns:p14="http://schemas.microsoft.com/office/powerpoint/2010/main" val="184461416"/>
       </p:ext>
     </p:extLst>
   </p:cSld>
@@ -1808,125 +1913,202 @@
           <a:lstStyle/>
           <a:p>
             <a:r>
-              <a:rPr lang="de-DE" b="1" dirty="0"/>
-              <a:t>Interpretation der Ergebnisse:</a:t>
-            </a:r>
+              <a:rPr lang="de-DE" sz="1200" b="1" dirty="0"/>
+              <a:t>Interpretation der Ergebnisse</a:t>
+            </a:r>
+            <a:endParaRPr lang="de-DE" sz="1200" dirty="0"/>
+          </a:p>
+          <a:p>
             <a:br>
-              <a:rPr lang="de-DE" dirty="0"/>
+              <a:rPr lang="de-DE" sz="1200" dirty="0"/>
             </a:br>
-            <a:r>
-              <a:rPr lang="de-DE" dirty="0"/>
-              <a:t>Desktop und Mobile zeigen ähnliche Nutzerzahlen sowie eine vergleichbare Gesamtzahl an Events – bei moderatem durchschnittlichen Engagement von etwa 0,45 Events pro Nutzer.</a:t>
-            </a:r>
-          </a:p>
-          <a:p>
-            <a:r>
-              <a:rPr lang="de-DE" dirty="0"/>
-              <a:t>Tablets und Smart TVs fallen auf: Trotz deutlich geringerer Nutzerzahlen liegt das durchschnittliche Engagement hier bei über 11 bzw. 19 Events pro Nutzer – was auf besonders intensive Nutzung hinzudeuten scheint.</a:t>
-            </a:r>
-          </a:p>
-          <a:p>
-            <a:r>
-              <a:rPr lang="de-DE" b="1" dirty="0"/>
-              <a:t>Wichtiger Hinweis zur Datenlage:</a:t>
-            </a:r>
             <a:br>
-              <a:rPr lang="de-DE" dirty="0"/>
+              <a:rPr lang="de-DE" sz="1200" dirty="0"/>
             </a:br>
             <a:r>
-              <a:rPr lang="de-DE" dirty="0"/>
-              <a:t>Die Berechnung der Events pro Nutzer je Gerätetyp basiert auf aggregierten Tageswerten, </a:t>
-            </a:r>
-            <a:r>
-              <a:rPr lang="de-DE" b="1" dirty="0"/>
-              <a:t>ohne direkte Verknüpfung zwischen Gerät und Eventverhalten einzelner Nutzer</a:t>
-            </a:r>
-            <a:r>
-              <a:rPr lang="de-DE" dirty="0"/>
-              <a:t>. Es ist also </a:t>
-            </a:r>
-            <a:r>
-              <a:rPr lang="de-DE" b="1" dirty="0"/>
-              <a:t>nicht belegbar</a:t>
-            </a:r>
-            <a:r>
-              <a:rPr lang="de-DE" dirty="0"/>
-              <a:t>, ob Events tatsächlich über das jeweilige Gerät ausgelöst wurden. Die Werte sind daher als </a:t>
-            </a:r>
-            <a:r>
-              <a:rPr lang="de-DE" b="1" dirty="0"/>
-              <a:t>modellhafte Näherung</a:t>
-            </a:r>
-            <a:r>
-              <a:rPr lang="de-DE" dirty="0"/>
-              <a:t> zu verstehen – und nicht als exakte Messung.</a:t>
-            </a:r>
+              <a:rPr lang="de-DE" sz="1200" b="1" dirty="0"/>
+              <a:t>Auffällig:</a:t>
+            </a:r>
+            <a:endParaRPr lang="de-DE" sz="1200" dirty="0"/>
+          </a:p>
+          <a:p>
+            <a:r>
+              <a:rPr lang="de-DE" sz="1200" dirty="0"/>
+              <a:t>- Die Seite „Ich brauche Redezeit“ generiert </a:t>
+            </a:r>
+            <a:r>
+              <a:rPr lang="de-DE" sz="1200" b="1" dirty="0"/>
+              <a:t>extrem viele Aufrufe</a:t>
+            </a:r>
+            <a:r>
+              <a:rPr lang="de-DE" sz="1200" dirty="0"/>
+              <a:t> über mehrere Quellen – besonders Google und Direktzugriffe.</a:t>
+            </a:r>
+          </a:p>
+          <a:p>
+            <a:r>
+              <a:rPr lang="de-DE" sz="1200" dirty="0"/>
+              <a:t>- Die </a:t>
+            </a:r>
+            <a:r>
+              <a:rPr lang="de-DE" sz="1200" b="1" dirty="0"/>
+              <a:t>Verweildauer liegt stabil bei ca. 97 Sekunden</a:t>
+            </a:r>
+            <a:r>
+              <a:rPr lang="de-DE" sz="1200" dirty="0"/>
+              <a:t>, was ein gutes Engagement signalisiert.</a:t>
+            </a:r>
+          </a:p>
+          <a:p>
+            <a:r>
+              <a:rPr lang="de-DE" sz="1200" dirty="0"/>
+              <a:t>- Die </a:t>
+            </a:r>
+            <a:r>
+              <a:rPr lang="de-DE" sz="1200" b="1" dirty="0"/>
+              <a:t>Absprungrate bleibt unter 30 %</a:t>
+            </a:r>
+            <a:r>
+              <a:rPr lang="de-DE" sz="1200" dirty="0"/>
+              <a:t>, was für Landingpages ein sehr positiver Wert ist.</a:t>
+            </a:r>
+          </a:p>
+          <a:p>
+            <a:br>
+              <a:rPr lang="de-DE" sz="1200" dirty="0"/>
+            </a:br>
+            <a:r>
+              <a:rPr lang="de-DE" sz="1200" dirty="0"/>
+              <a:t>Am Ende der Tabelle erscheinen Seiten mit </a:t>
+            </a:r>
+            <a:r>
+              <a:rPr lang="de-DE" sz="1200" b="1" dirty="0"/>
+              <a:t>0 Aufrufen</a:t>
+            </a:r>
+            <a:r>
+              <a:rPr lang="de-DE" sz="1200" dirty="0"/>
+              <a:t>, was meist durch technische Gründe oder irrelevante Inhalte erklärt werden kann.</a:t>
+            </a:r>
+          </a:p>
+          <a:p>
+            <a:endParaRPr lang="de-DE" sz="1200" dirty="0"/>
+          </a:p>
+          <a:p>
+            <a:r>
+              <a:rPr lang="de-DE" sz="1200" b="1" dirty="0"/>
+              <a:t>Was lässt sich daraus ableiten?</a:t>
+            </a:r>
+            <a:endParaRPr lang="de-DE" sz="1200" dirty="0"/>
+          </a:p>
+          <a:p>
+            <a:br>
+              <a:rPr lang="de-DE" sz="1200" dirty="0"/>
+            </a:br>
+            <a:r>
+              <a:rPr lang="de-DE" sz="1200" dirty="0"/>
+              <a:t>- </a:t>
+            </a:r>
+            <a:r>
+              <a:rPr lang="de-DE" sz="1200" b="1" dirty="0"/>
+              <a:t>Top-</a:t>
+            </a:r>
+            <a:r>
+              <a:rPr lang="de-DE" sz="1200" b="1" dirty="0" err="1"/>
+              <a:t>performing</a:t>
+            </a:r>
+            <a:r>
+              <a:rPr lang="de-DE" sz="1200" b="1" dirty="0"/>
+              <a:t> Inhalte identifizieren:</a:t>
+            </a:r>
+            <a:endParaRPr lang="de-DE" sz="1200" dirty="0"/>
+          </a:p>
+          <a:p>
+            <a:r>
+              <a:rPr lang="de-DE" sz="1200" dirty="0"/>
+              <a:t>  Die Seite „Ich brauche Redezeit“ ist sowohl bei organischer als auch direkter Quelle </a:t>
+            </a:r>
+            <a:r>
+              <a:rPr lang="de-DE" sz="1200" b="1" dirty="0"/>
+              <a:t>hochgradig relevant</a:t>
+            </a:r>
+            <a:r>
+              <a:rPr lang="de-DE" sz="1200" dirty="0"/>
+              <a:t> – sie sollte zentrales Element in SEO, Werbung und Startseite sein.</a:t>
+            </a:r>
+          </a:p>
+          <a:p>
+            <a:br>
+              <a:rPr lang="de-DE" sz="1200" dirty="0"/>
+            </a:br>
+            <a:r>
+              <a:rPr lang="de-DE" sz="1200" dirty="0"/>
+              <a:t>- </a:t>
+            </a:r>
+            <a:r>
+              <a:rPr lang="de-DE" sz="1200" b="1" dirty="0"/>
+              <a:t>Quellenbewertung möglich:</a:t>
+            </a:r>
+            <a:endParaRPr lang="de-DE" sz="1200" dirty="0"/>
+          </a:p>
+          <a:p>
+            <a:r>
+              <a:rPr lang="de-DE" sz="1200" dirty="0"/>
+              <a:t>  Wenn bestimmte Seiten </a:t>
+            </a:r>
+            <a:r>
+              <a:rPr lang="de-DE" sz="1200" b="1" dirty="0"/>
+              <a:t>**nur über einzelne Quellen</a:t>
+            </a:r>
+            <a:r>
+              <a:rPr lang="de-DE" sz="1200" dirty="0"/>
+              <a:t> erfolgreich sind, kann man gezielt z. B. Google Ads verstärken oder Kooperationen mit verlinkenden Seiten ausbauen.</a:t>
+            </a:r>
+          </a:p>
+          <a:p>
+            <a:br>
+              <a:rPr lang="de-DE" sz="1200" dirty="0"/>
+            </a:br>
+            <a:r>
+              <a:rPr lang="de-DE" sz="1200" dirty="0"/>
+              <a:t>- </a:t>
+            </a:r>
+            <a:r>
+              <a:rPr lang="de-DE" sz="1200" b="1" dirty="0"/>
+              <a:t>Niedrige Absprungraten**</a:t>
+            </a:r>
+            <a:r>
+              <a:rPr lang="de-DE" sz="1200" dirty="0"/>
+              <a:t> deuten auf einen funktionierenden ersten Eindruck hin – diese Seiten sind gut optimiert.</a:t>
+            </a:r>
+          </a:p>
+          <a:p>
+            <a:br>
+              <a:rPr lang="de-DE" sz="1200" dirty="0"/>
+            </a:br>
+            <a:r>
+              <a:rPr lang="de-DE" sz="1200" dirty="0"/>
+              <a:t>- </a:t>
+            </a:r>
+            <a:r>
+              <a:rPr lang="de-DE" sz="1200" b="1" dirty="0"/>
+              <a:t>Handlungsbedarf bei Seiten mit 0 Aufrufen oder hoher Absprungrate:</a:t>
+            </a:r>
+            <a:r>
+              <a:rPr lang="de-DE" sz="1200" dirty="0"/>
+              <a:t>  </a:t>
+            </a:r>
+          </a:p>
+          <a:p>
+            <a:r>
+              <a:rPr lang="de-DE" sz="1200" dirty="0"/>
+              <a:t>  Diese Seiten sollten hinsichtlich Sichtbarkeit, Relevanz oder technischer Funktion geprüft werden.</a:t>
+            </a:r>
+          </a:p>
+          <a:p>
+            <a:endParaRPr lang="de-DE" sz="1200" dirty="0"/>
           </a:p>
           <a:p>
             <a:endParaRPr lang="de-DE" dirty="0"/>
-          </a:p>
-          <a:p>
-            <a:r>
-              <a:rPr lang="de-DE" b="1" dirty="0"/>
-              <a:t>Ableitungen:</a:t>
-            </a:r>
-            <a:br>
-              <a:rPr lang="de-DE" dirty="0"/>
-            </a:br>
-            <a:r>
-              <a:rPr lang="de-DE" dirty="0"/>
-              <a:t>Das Nutzerverhalten scheint stark vom Gerätetyp abzuhängen:</a:t>
-            </a:r>
-            <a:br>
-              <a:rPr lang="de-DE" dirty="0"/>
-            </a:br>
-            <a:r>
-              <a:rPr lang="de-DE" dirty="0"/>
-              <a:t>Viele Nutzer auf Desktop und Mobile – aber eher moderate Interaktionen.</a:t>
-            </a:r>
-            <a:br>
-              <a:rPr lang="de-DE" dirty="0"/>
-            </a:br>
-            <a:r>
-              <a:rPr lang="de-DE" dirty="0"/>
-              <a:t>Geringe, aber dafür besonders aktive Nutzung auf Tablets und Smart TVs.</a:t>
-            </a:r>
-          </a:p>
-          <a:p>
-            <a:r>
-              <a:rPr lang="de-DE" b="1" dirty="0"/>
-              <a:t>Vorsicht bei kleinen Fallzahlen:</a:t>
-            </a:r>
-            <a:br>
-              <a:rPr lang="de-DE" dirty="0"/>
-            </a:br>
-            <a:r>
-              <a:rPr lang="de-DE" dirty="0"/>
-              <a:t>Besonders bei Smart TVs (nur 7 Nutzer) kann schon ein einzelner Vielnutzer die Engagement-Rate stark verzerren.</a:t>
-            </a:r>
-          </a:p>
-          <a:p>
-            <a:endParaRPr lang="de-DE" dirty="0"/>
-          </a:p>
-          <a:p>
-            <a:r>
-              <a:rPr lang="de-DE" b="1" dirty="0"/>
-              <a:t>Handlungsempfehlung:</a:t>
-            </a:r>
-            <a:br>
-              <a:rPr lang="de-DE" dirty="0"/>
-            </a:br>
-            <a:r>
-              <a:rPr lang="de-DE" dirty="0"/>
-              <a:t>Eine genauere technische Analyse sollte klären, ob das hohe Engagement auf Tablets und Smart TVs auf bestimmte Inhalte, Interfaces oder Nutzungskontexte zurückzuführen ist.</a:t>
-            </a:r>
-            <a:br>
-              <a:rPr lang="de-DE" dirty="0"/>
-            </a:br>
-            <a:r>
-              <a:rPr lang="de-DE" dirty="0"/>
-              <a:t>Zudem lohnt sich die Frage, ob Desktop- und Mobile-Angebote gezielt optimiert werden können, um das Engagement zu steigern.</a:t>
-            </a:r>
           </a:p>
         </p:txBody>
       </p:sp>
@@ -1947,7 +2129,7 @@
           <a:p>
             <a:fld id="{6D0EAAEC-3026-475C-AE13-EBFCAFEF86C8}" type="slidenum">
               <a:rPr lang="de-DE" smtClean="0"/>
-              <a:t>15</a:t>
+              <a:t>16</a:t>
             </a:fld>
             <a:endParaRPr lang="de-DE"/>
           </a:p>
@@ -1956,7 +2138,7 @@
     </p:spTree>
     <p:extLst>
       <p:ext uri="{BB962C8B-B14F-4D97-AF65-F5344CB8AC3E}">
-        <p14:creationId xmlns:p14="http://schemas.microsoft.com/office/powerpoint/2010/main" val="3093709546"/>
+        <p14:creationId xmlns:p14="http://schemas.microsoft.com/office/powerpoint/2010/main" val="2444359810"/>
       </p:ext>
     </p:extLst>
   </p:cSld>
@@ -2012,82 +2194,123 @@
           <a:p>
             <a:r>
               <a:rPr lang="de-DE" b="1" dirty="0"/>
-              <a:t>Einschränkungen durch die Datenlage</a:t>
-            </a:r>
-          </a:p>
-          <a:p>
-            <a:r>
-              <a:rPr lang="de-DE" b="1" i="1" u="sng" dirty="0"/>
-              <a:t>Die Analysen basieren auf aggregierten Tagesdaten, nicht auf Nutzerebene!!!</a:t>
-            </a:r>
-          </a:p>
-          <a:p>
-            <a:endParaRPr lang="de-DE" b="1" i="1" u="sng" dirty="0"/>
-          </a:p>
-          <a:p>
-            <a:r>
+              <a:t>Interpretation der Ergebnisse:</a:t>
+            </a:r>
+            <a:br>
               <a:rPr lang="de-DE" dirty="0"/>
-              <a:t>Nutzer können mehreren Geräten zugeordnet sein, was eine exakte Zuordnung verhindert.</a:t>
-            </a:r>
-          </a:p>
-          <a:p>
+            </a:br>
             <a:r>
               <a:rPr lang="de-DE" dirty="0"/>
-              <a:t>Gewichtungen nach Geräten und Geschlecht erfolgen über Annahmen und Proportionen, nicht über echte Nutzerprofile.</a:t>
+              <a:t>Desktop und Mobile zeigen ähnliche Nutzerzahlen sowie eine vergleichbare Gesamtzahl an Events – bei moderatem durchschnittlichen Engagement von etwa 0,45 Events pro Nutzer.</a:t>
             </a:r>
           </a:p>
           <a:p>
             <a:r>
               <a:rPr lang="de-DE" dirty="0"/>
-              <a:t>Kleine Nutzergruppen, insbesondere bei bestimmten Geräten oder Geschlechtern, können zu verzerrten oder überinterpretierten Ergebnissen führen.</a:t>
-            </a:r>
-          </a:p>
-          <a:p>
-            <a:endParaRPr lang="de-DE" b="1" dirty="0"/>
-          </a:p>
-          <a:p>
-            <a:endParaRPr lang="de-DE" b="1" dirty="0"/>
+              <a:t>Tablets und Smart TVs fallen auf: Trotz deutlich geringerer Nutzerzahlen liegt das durchschnittliche Engagement hier bei über 11 bzw. 19 Events pro Nutzer – was auf besonders intensive Nutzung hinzudeuten scheint.</a:t>
+            </a:r>
           </a:p>
           <a:p>
             <a:r>
               <a:rPr lang="de-DE" b="1" dirty="0"/>
-              <a:t>Fazit und Ausblick</a:t>
-            </a:r>
-          </a:p>
-          <a:p>
-            <a:r>
+              <a:t>Wichtiger Hinweis zur Datenlage:</a:t>
+            </a:r>
+            <a:br>
               <a:rPr lang="de-DE" dirty="0"/>
-              <a:t>Der Apriori-Algorithmus ist ein mächtiges Werkzeug, um </a:t>
+            </a:br>
+            <a:r>
+              <a:rPr lang="de-DE" dirty="0"/>
+              <a:t>Die Berechnung der Events pro Nutzer je Gerätetyp basiert auf aggregierten Tageswerten, </a:t>
             </a:r>
             <a:r>
               <a:rPr lang="de-DE" b="1" dirty="0"/>
-              <a:t>Verhaltensmuster und Zusammenhänge</a:t>
+              <a:t>ohne direkte Verknüpfung zwischen Gerät und Eventverhalten einzelner Nutzer</a:t>
             </a:r>
             <a:r>
               <a:rPr lang="de-DE" dirty="0"/>
-              <a:t> aufzudecken. Allerdings sind die Resultate hier eher </a:t>
+              <a:t>. Es ist also </a:t>
             </a:r>
             <a:r>
               <a:rPr lang="de-DE" b="1" dirty="0"/>
-              <a:t>hypothesenbildend als endgültig</a:t>
+              <a:t>nicht belegbar</a:t>
             </a:r>
             <a:r>
               <a:rPr lang="de-DE" dirty="0"/>
-              <a:t>, da die Daten keine direkte Nutzer-zu-Gerät-Zuordnung zulassen.</a:t>
-            </a:r>
-          </a:p>
-          <a:p>
+              <a:t>, ob Events tatsächlich über das jeweilige Gerät ausgelöst wurden. Die Werte sind daher als </a:t>
+            </a:r>
+            <a:r>
+              <a:rPr lang="de-DE" b="1" dirty="0"/>
+              <a:t>modellhafte Näherung</a:t>
+            </a:r>
             <a:r>
               <a:rPr lang="de-DE" dirty="0"/>
-              <a:t>Für belastbare Erkenntnisse empfiehlt sich eine </a:t>
-            </a:r>
+              <a:t> zu verstehen – und nicht als exakte Messung.</a:t>
+            </a:r>
+          </a:p>
+          <a:p>
+            <a:endParaRPr lang="de-DE" dirty="0"/>
+          </a:p>
+          <a:p>
             <a:r>
               <a:rPr lang="de-DE" b="1" dirty="0"/>
-              <a:t>Datenerfassung auf Nutzerbasis</a:t>
-            </a:r>
-            <a:r>
+              <a:t>Ableitungen:</a:t>
+            </a:r>
+            <a:br>
               <a:rPr lang="de-DE" dirty="0"/>
-              <a:t>, um valide Assoziationen zwischen Aktionen und Nutzermerkmalen zu ermöglichen.</a:t>
+            </a:br>
+            <a:r>
+              <a:rPr lang="de-DE" dirty="0"/>
+              <a:t>Das Nutzerverhalten scheint stark vom Gerätetyp abzuhängen:</a:t>
+            </a:r>
+            <a:br>
+              <a:rPr lang="de-DE" dirty="0"/>
+            </a:br>
+            <a:r>
+              <a:rPr lang="de-DE" dirty="0"/>
+              <a:t>Viele Nutzer auf Desktop und Mobile – aber eher moderate Interaktionen.</a:t>
+            </a:r>
+            <a:br>
+              <a:rPr lang="de-DE" dirty="0"/>
+            </a:br>
+            <a:r>
+              <a:rPr lang="de-DE" dirty="0"/>
+              <a:t>Geringe, aber dafür besonders aktive Nutzung auf Tablets und Smart TVs.</a:t>
+            </a:r>
+          </a:p>
+          <a:p>
+            <a:r>
+              <a:rPr lang="de-DE" b="1" dirty="0"/>
+              <a:t>Vorsicht bei kleinen Fallzahlen:</a:t>
+            </a:r>
+            <a:br>
+              <a:rPr lang="de-DE" dirty="0"/>
+            </a:br>
+            <a:r>
+              <a:rPr lang="de-DE" dirty="0"/>
+              <a:t>Besonders bei Smart TVs (nur 7 Nutzer) kann schon ein einzelner Vielnutzer die Engagement-Rate stark verzerren.</a:t>
+            </a:r>
+          </a:p>
+          <a:p>
+            <a:endParaRPr lang="de-DE" dirty="0"/>
+          </a:p>
+          <a:p>
+            <a:r>
+              <a:rPr lang="de-DE" b="1" dirty="0"/>
+              <a:t>Handlungsempfehlung:</a:t>
+            </a:r>
+            <a:br>
+              <a:rPr lang="de-DE" dirty="0"/>
+            </a:br>
+            <a:r>
+              <a:rPr lang="de-DE" dirty="0"/>
+              <a:t>Eine genauere technische Analyse sollte klären, ob das hohe Engagement auf Tablets und Smart TVs auf bestimmte Inhalte, Interfaces oder Nutzungskontexte zurückzuführen ist.</a:t>
+            </a:r>
+            <a:br>
+              <a:rPr lang="de-DE" dirty="0"/>
+            </a:br>
+            <a:r>
+              <a:rPr lang="de-DE" dirty="0"/>
+              <a:t>Zudem lohnt sich die Frage, ob Desktop- und Mobile-Angebote gezielt optimiert werden können, um das Engagement zu steigern.</a:t>
             </a:r>
           </a:p>
         </p:txBody>
@@ -2109,7 +2332,169 @@
           <a:p>
             <a:fld id="{6D0EAAEC-3026-475C-AE13-EBFCAFEF86C8}" type="slidenum">
               <a:rPr lang="de-DE" smtClean="0"/>
-              <a:t>16</a:t>
+              <a:t>17</a:t>
+            </a:fld>
+            <a:endParaRPr lang="de-DE"/>
+          </a:p>
+        </p:txBody>
+      </p:sp>
+    </p:spTree>
+    <p:extLst>
+      <p:ext uri="{BB962C8B-B14F-4D97-AF65-F5344CB8AC3E}">
+        <p14:creationId xmlns:p14="http://schemas.microsoft.com/office/powerpoint/2010/main" val="3093709546"/>
+      </p:ext>
+    </p:extLst>
+  </p:cSld>
+  <p:clrMapOvr>
+    <a:masterClrMapping/>
+  </p:clrMapOvr>
+</p:notes>
+</file>
+
+<file path=ppt/notesSlides/notesSlide16.xml><?xml version="1.0" encoding="utf-8"?>
+<p:notes xmlns:a="http://schemas.openxmlformats.org/drawingml/2006/main" xmlns:r="http://schemas.openxmlformats.org/officeDocument/2006/relationships" xmlns:p="http://schemas.openxmlformats.org/presentationml/2006/main">
+  <p:cSld>
+    <p:spTree>
+      <p:nvGrpSpPr>
+        <p:cNvPr id="1" name=""/>
+        <p:cNvGrpSpPr/>
+        <p:nvPr/>
+      </p:nvGrpSpPr>
+      <p:grpSpPr>
+        <a:xfrm>
+          <a:off x="0" y="0"/>
+          <a:ext cx="0" cy="0"/>
+          <a:chOff x="0" y="0"/>
+          <a:chExt cx="0" cy="0"/>
+        </a:xfrm>
+      </p:grpSpPr>
+      <p:sp>
+        <p:nvSpPr>
+          <p:cNvPr id="2" name="Folienbildplatzhalter 1"/>
+          <p:cNvSpPr>
+            <a:spLocks noGrp="1" noRot="1" noChangeAspect="1"/>
+          </p:cNvSpPr>
+          <p:nvPr>
+            <p:ph type="sldImg"/>
+          </p:nvPr>
+        </p:nvSpPr>
+        <p:spPr/>
+      </p:sp>
+      <p:sp>
+        <p:nvSpPr>
+          <p:cNvPr id="3" name="Notizenplatzhalter 2"/>
+          <p:cNvSpPr>
+            <a:spLocks noGrp="1"/>
+          </p:cNvSpPr>
+          <p:nvPr>
+            <p:ph type="body" idx="1"/>
+          </p:nvPr>
+        </p:nvSpPr>
+        <p:spPr/>
+        <p:txBody>
+          <a:bodyPr/>
+          <a:lstStyle/>
+          <a:p>
+            <a:r>
+              <a:rPr lang="de-DE" b="1" dirty="0"/>
+              <a:t>Einschränkungen durch die Datenlage</a:t>
+            </a:r>
+          </a:p>
+          <a:p>
+            <a:r>
+              <a:rPr lang="de-DE" b="1" i="1" u="sng" dirty="0"/>
+              <a:t>Die Analysen basieren auf aggregierten Tagesdaten, nicht auf Nutzerebene!!!</a:t>
+            </a:r>
+          </a:p>
+          <a:p>
+            <a:endParaRPr lang="de-DE" b="1" i="1" u="sng" dirty="0"/>
+          </a:p>
+          <a:p>
+            <a:r>
+              <a:rPr lang="de-DE" dirty="0"/>
+              <a:t>Nutzer können mehreren Geräten zugeordnet sein, was eine exakte Zuordnung verhindert.</a:t>
+            </a:r>
+          </a:p>
+          <a:p>
+            <a:r>
+              <a:rPr lang="de-DE" dirty="0"/>
+              <a:t>Gewichtungen nach Geräten und Geschlecht erfolgen über Annahmen und Proportionen, nicht über echte Nutzerprofile.</a:t>
+            </a:r>
+          </a:p>
+          <a:p>
+            <a:r>
+              <a:rPr lang="de-DE" dirty="0"/>
+              <a:t>Kleine Nutzergruppen, insbesondere bei bestimmten Geräten oder Geschlechtern, können zu verzerrten oder überinterpretierten Ergebnissen führen.</a:t>
+            </a:r>
+          </a:p>
+          <a:p>
+            <a:endParaRPr lang="de-DE" b="1" dirty="0"/>
+          </a:p>
+          <a:p>
+            <a:endParaRPr lang="de-DE" b="1" dirty="0"/>
+          </a:p>
+          <a:p>
+            <a:r>
+              <a:rPr lang="de-DE" b="1" dirty="0"/>
+              <a:t>Fazit und Ausblick</a:t>
+            </a:r>
+          </a:p>
+          <a:p>
+            <a:r>
+              <a:rPr lang="de-DE" dirty="0"/>
+              <a:t>Der Apriori-Algorithmus ist ein mächtiges Werkzeug, um </a:t>
+            </a:r>
+            <a:r>
+              <a:rPr lang="de-DE" b="1" dirty="0"/>
+              <a:t>Verhaltensmuster und Zusammenhänge</a:t>
+            </a:r>
+            <a:r>
+              <a:rPr lang="de-DE" dirty="0"/>
+              <a:t> aufzudecken. Allerdings sind die Resultate hier eher </a:t>
+            </a:r>
+            <a:r>
+              <a:rPr lang="de-DE" b="1" dirty="0"/>
+              <a:t>hypothesenbildend als endgültig</a:t>
+            </a:r>
+            <a:r>
+              <a:rPr lang="de-DE" dirty="0"/>
+              <a:t>, da die Daten keine direkte Nutzer-zu-Gerät-Zuordnung zulassen.</a:t>
+            </a:r>
+          </a:p>
+          <a:p>
+            <a:r>
+              <a:rPr lang="de-DE" dirty="0"/>
+              <a:t>Für belastbare Erkenntnisse empfiehlt sich eine </a:t>
+            </a:r>
+            <a:r>
+              <a:rPr lang="de-DE" b="1" dirty="0"/>
+              <a:t>Datenerfassung auf Nutzerbasis</a:t>
+            </a:r>
+            <a:r>
+              <a:rPr lang="de-DE" dirty="0"/>
+              <a:t>, um valide Assoziationen zwischen Aktionen und Nutzermerkmalen zu ermöglichen.</a:t>
+            </a:r>
+          </a:p>
+        </p:txBody>
+      </p:sp>
+      <p:sp>
+        <p:nvSpPr>
+          <p:cNvPr id="4" name="Foliennummernplatzhalter 3"/>
+          <p:cNvSpPr>
+            <a:spLocks noGrp="1"/>
+          </p:cNvSpPr>
+          <p:nvPr>
+            <p:ph type="sldNum" sz="quarter" idx="5"/>
+          </p:nvPr>
+        </p:nvSpPr>
+        <p:spPr/>
+        <p:txBody>
+          <a:bodyPr/>
+          <a:lstStyle/>
+          <a:p>
+            <a:fld id="{6D0EAAEC-3026-475C-AE13-EBFCAFEF86C8}" type="slidenum">
+              <a:rPr lang="de-DE" smtClean="0"/>
+              <a:t>18</a:t>
             </a:fld>
             <a:endParaRPr lang="de-DE"/>
           </a:p>
@@ -4340,6 +4725,18 @@
         <p:txBody>
           <a:bodyPr/>
           <a:lstStyle/>
+          <a:p>
+            <a:r>
+              <a:rPr lang="de-DE" dirty="0"/>
+              <a:t>„Welche Nutzungsmuster zeigt die Website an verschiedenen Tagen?“</a:t>
+            </a:r>
+          </a:p>
+          <a:p>
+            <a:endParaRPr lang="de-DE" sz="1200" b="1" dirty="0"/>
+          </a:p>
+          <a:p>
+            <a:endParaRPr lang="de-DE" sz="1200" b="1" dirty="0"/>
+          </a:p>
           <a:p>
             <a:r>
               <a:rPr lang="de-DE" sz="1200" b="1" dirty="0"/>
@@ -8207,6 +8604,1018 @@
           <a:chExt cx="0" cy="0"/>
         </a:xfrm>
       </p:grpSpPr>
+      <p:pic>
+        <p:nvPicPr>
+          <p:cNvPr id="3" name="Grafik 2">
+            <a:extLst>
+              <a:ext uri="{FF2B5EF4-FFF2-40B4-BE49-F238E27FC236}">
+                <a16:creationId xmlns:a16="http://schemas.microsoft.com/office/drawing/2014/main" id="{E82A6109-A0E9-8B66-9841-92219F8F5273}"/>
+              </a:ext>
+            </a:extLst>
+          </p:cNvPr>
+          <p:cNvPicPr>
+            <a:picLocks noChangeAspect="1"/>
+          </p:cNvPicPr>
+          <p:nvPr/>
+        </p:nvPicPr>
+        <p:blipFill>
+          <a:blip r:embed="rId2"/>
+          <a:stretch>
+            <a:fillRect/>
+          </a:stretch>
+        </p:blipFill>
+        <p:spPr>
+          <a:xfrm>
+            <a:off x="6281904" y="0"/>
+            <a:ext cx="5910095" cy="4173415"/>
+          </a:xfrm>
+          <a:prstGeom prst="rect">
+            <a:avLst/>
+          </a:prstGeom>
+        </p:spPr>
+      </p:pic>
+      <p:pic>
+        <p:nvPicPr>
+          <p:cNvPr id="5" name="Grafik 4">
+            <a:extLst>
+              <a:ext uri="{FF2B5EF4-FFF2-40B4-BE49-F238E27FC236}">
+                <a16:creationId xmlns:a16="http://schemas.microsoft.com/office/drawing/2014/main" id="{419DED78-641E-56CC-92F8-34DDCC60717E}"/>
+              </a:ext>
+            </a:extLst>
+          </p:cNvPr>
+          <p:cNvPicPr>
+            <a:picLocks noChangeAspect="1"/>
+          </p:cNvPicPr>
+          <p:nvPr/>
+        </p:nvPicPr>
+        <p:blipFill>
+          <a:blip r:embed="rId3"/>
+          <a:stretch>
+            <a:fillRect/>
+          </a:stretch>
+        </p:blipFill>
+        <p:spPr>
+          <a:xfrm>
+            <a:off x="0" y="0"/>
+            <a:ext cx="5620921" cy="4173415"/>
+          </a:xfrm>
+          <a:prstGeom prst="rect">
+            <a:avLst/>
+          </a:prstGeom>
+        </p:spPr>
+      </p:pic>
+      <p:sp>
+        <p:nvSpPr>
+          <p:cNvPr id="7" name="Textfeld 6">
+            <a:extLst>
+              <a:ext uri="{FF2B5EF4-FFF2-40B4-BE49-F238E27FC236}">
+                <a16:creationId xmlns:a16="http://schemas.microsoft.com/office/drawing/2014/main" id="{8A8126C7-92C0-633D-C06F-61CC5B8FC0B7}"/>
+              </a:ext>
+            </a:extLst>
+          </p:cNvPr>
+          <p:cNvSpPr txBox="1"/>
+          <p:nvPr/>
+        </p:nvSpPr>
+        <p:spPr>
+          <a:xfrm>
+            <a:off x="0" y="4027687"/>
+            <a:ext cx="12090398" cy="2677656"/>
+          </a:xfrm>
+          <a:prstGeom prst="rect">
+            <a:avLst/>
+          </a:prstGeom>
+          <a:noFill/>
+        </p:spPr>
+        <p:txBody>
+          <a:bodyPr wrap="square">
+            <a:spAutoFit/>
+          </a:bodyPr>
+          <a:lstStyle/>
+          <a:p>
+            <a:pPr algn="l">
+              <a:buFont typeface="Arial" panose="020B0604020202020204" pitchFamily="34" charset="0"/>
+              <a:buChar char="•"/>
+            </a:pPr>
+            <a:r>
+              <a:rPr lang="de-DE" sz="1400" b="1" i="0" dirty="0">
+                <a:solidFill>
+                  <a:schemeClr val="bg2">
+                    <a:lumMod val="25000"/>
+                  </a:schemeClr>
+                </a:solidFill>
+                <a:effectLst/>
+              </a:rPr>
+              <a:t>„Desktop Nutzer, hohe Aktivität“</a:t>
+            </a:r>
+            <a:r>
+              <a:rPr lang="de-DE" sz="1400" b="0" i="0" dirty="0">
+                <a:solidFill>
+                  <a:schemeClr val="bg2">
+                    <a:lumMod val="25000"/>
+                  </a:schemeClr>
+                </a:solidFill>
+                <a:effectLst/>
+              </a:rPr>
+              <a:t>: viele Seitenaufrufe (284,5), hohe Desktop-Nutzung (162,9), lange Verweildauer (130 Sek.)</a:t>
+            </a:r>
+          </a:p>
+          <a:p>
+            <a:pPr algn="l">
+              <a:buFont typeface="Arial" panose="020B0604020202020204" pitchFamily="34" charset="0"/>
+              <a:buChar char="•"/>
+            </a:pPr>
+            <a:r>
+              <a:rPr lang="de-DE" sz="1400" b="1" i="0" dirty="0">
+                <a:solidFill>
+                  <a:schemeClr val="bg2">
+                    <a:lumMod val="25000"/>
+                  </a:schemeClr>
+                </a:solidFill>
+                <a:effectLst/>
+              </a:rPr>
+              <a:t>„Mobile Nutzer, hohe Verweildauer“</a:t>
+            </a:r>
+            <a:r>
+              <a:rPr lang="de-DE" sz="1400" b="0" i="0" dirty="0">
+                <a:solidFill>
+                  <a:schemeClr val="bg2">
+                    <a:lumMod val="25000"/>
+                  </a:schemeClr>
+                </a:solidFill>
+                <a:effectLst/>
+              </a:rPr>
+              <a:t>: Seitenaufrufe (90,6), überwiegend mobile Geräte (48,6), Verweildauer 98 Sek.</a:t>
+            </a:r>
+          </a:p>
+          <a:p>
+            <a:pPr algn="l">
+              <a:buFont typeface="Arial" panose="020B0604020202020204" pitchFamily="34" charset="0"/>
+              <a:buChar char="•"/>
+            </a:pPr>
+            <a:r>
+              <a:rPr lang="de-DE" sz="1400" b="1" i="0" dirty="0">
+                <a:solidFill>
+                  <a:schemeClr val="bg2">
+                    <a:lumMod val="25000"/>
+                  </a:schemeClr>
+                </a:solidFill>
+                <a:effectLst/>
+              </a:rPr>
+              <a:t>„Geringe Nutzerzahl &amp; Traffic“</a:t>
+            </a:r>
+            <a:r>
+              <a:rPr lang="de-DE" sz="1400" b="0" i="0" dirty="0">
+                <a:solidFill>
+                  <a:schemeClr val="bg2">
+                    <a:lumMod val="25000"/>
+                  </a:schemeClr>
+                </a:solidFill>
+                <a:effectLst/>
+              </a:rPr>
+              <a:t>: Nutzerzahl (26,4), Sitzungen über Google/</a:t>
+            </a:r>
+            <a:r>
+              <a:rPr lang="de-DE" sz="1400" b="0" i="0" dirty="0" err="1">
+                <a:solidFill>
+                  <a:schemeClr val="bg2">
+                    <a:lumMod val="25000"/>
+                  </a:schemeClr>
+                </a:solidFill>
+                <a:effectLst/>
+              </a:rPr>
+              <a:t>Direct</a:t>
+            </a:r>
+            <a:r>
+              <a:rPr lang="de-DE" sz="1400" b="0" i="0" dirty="0">
+                <a:solidFill>
+                  <a:schemeClr val="bg2">
+                    <a:lumMod val="25000"/>
+                  </a:schemeClr>
+                </a:solidFill>
+                <a:effectLst/>
+              </a:rPr>
+              <a:t> (~12/~10)</a:t>
+            </a:r>
+          </a:p>
+          <a:p>
+            <a:pPr algn="l">
+              <a:buFont typeface="Arial" panose="020B0604020202020204" pitchFamily="34" charset="0"/>
+              <a:buChar char="•"/>
+            </a:pPr>
+            <a:r>
+              <a:rPr lang="de-DE" sz="1400" b="1" i="0" dirty="0">
+                <a:solidFill>
+                  <a:schemeClr val="bg2">
+                    <a:lumMod val="25000"/>
+                  </a:schemeClr>
+                </a:solidFill>
+                <a:effectLst/>
+              </a:rPr>
+              <a:t>„Hoher Traffic &amp; Engagement“</a:t>
+            </a:r>
+            <a:r>
+              <a:rPr lang="de-DE" sz="1400" b="0" i="0" dirty="0">
+                <a:solidFill>
+                  <a:schemeClr val="bg2">
+                    <a:lumMod val="25000"/>
+                  </a:schemeClr>
+                </a:solidFill>
+                <a:effectLst/>
+              </a:rPr>
+              <a:t>: Nutzer (76,1), Google-Traffic (55,8), Events (55,6)</a:t>
+            </a:r>
+          </a:p>
+          <a:p>
+            <a:pPr algn="l">
+              <a:buFont typeface="Arial" panose="020B0604020202020204" pitchFamily="34" charset="0"/>
+              <a:buChar char="•"/>
+            </a:pPr>
+            <a:r>
+              <a:rPr lang="de-DE" sz="1400" b="1" i="0" dirty="0">
+                <a:solidFill>
+                  <a:schemeClr val="bg2">
+                    <a:lumMod val="25000"/>
+                  </a:schemeClr>
+                </a:solidFill>
+                <a:effectLst/>
+              </a:rPr>
+              <a:t>„Kurze bis mittlere Verweildauer“</a:t>
+            </a:r>
+            <a:r>
+              <a:rPr lang="de-DE" sz="1400" b="0" i="0" dirty="0">
+                <a:solidFill>
+                  <a:schemeClr val="bg2">
+                    <a:lumMod val="25000"/>
+                  </a:schemeClr>
+                </a:solidFill>
+                <a:effectLst/>
+              </a:rPr>
+              <a:t>: Verweildauer (109 Sek.), Nutzer (28,6), Seiten/Sitzung (5,5)</a:t>
+            </a:r>
+          </a:p>
+          <a:p>
+            <a:pPr algn="l">
+              <a:buFont typeface="Arial" panose="020B0604020202020204" pitchFamily="34" charset="0"/>
+              <a:buChar char="•"/>
+            </a:pPr>
+            <a:r>
+              <a:rPr lang="de-DE" sz="1400" b="1" i="0" dirty="0">
+                <a:solidFill>
+                  <a:schemeClr val="bg2">
+                    <a:lumMod val="25000"/>
+                  </a:schemeClr>
+                </a:solidFill>
+                <a:effectLst/>
+              </a:rPr>
+              <a:t>„Hohe Nutzerzahl mit schnellen Aktionen“</a:t>
+            </a:r>
+            <a:r>
+              <a:rPr lang="de-DE" sz="1400" b="0" i="0" dirty="0">
+                <a:solidFill>
+                  <a:schemeClr val="bg2">
+                    <a:lumMod val="25000"/>
+                  </a:schemeClr>
+                </a:solidFill>
+                <a:effectLst/>
+              </a:rPr>
+              <a:t>: Nutzer (78,1), Verweildauer (95 Sek.), Events (59,4)</a:t>
+            </a:r>
+          </a:p>
+          <a:p>
+            <a:pPr algn="l">
+              <a:buFont typeface="Arial" panose="020B0604020202020204" pitchFamily="34" charset="0"/>
+              <a:buChar char="•"/>
+            </a:pPr>
+            <a:r>
+              <a:rPr lang="de-DE" sz="1400" b="1" i="0" dirty="0">
+                <a:solidFill>
+                  <a:schemeClr val="bg2">
+                    <a:lumMod val="25000"/>
+                  </a:schemeClr>
+                </a:solidFill>
+                <a:effectLst/>
+              </a:rPr>
+              <a:t>„Intensive Nutzung“</a:t>
+            </a:r>
+            <a:r>
+              <a:rPr lang="de-DE" sz="1400" b="0" i="0" dirty="0">
+                <a:solidFill>
+                  <a:schemeClr val="bg2">
+                    <a:lumMod val="25000"/>
+                  </a:schemeClr>
+                </a:solidFill>
+                <a:effectLst/>
+              </a:rPr>
+              <a:t>: sehr lange Verweildauer (471 Sek.), wenige Nutzer (2,2)</a:t>
+            </a:r>
+          </a:p>
+          <a:p>
+            <a:pPr algn="l">
+              <a:buFont typeface="Arial" panose="020B0604020202020204" pitchFamily="34" charset="0"/>
+              <a:buChar char="•"/>
+            </a:pPr>
+            <a:r>
+              <a:rPr lang="de-DE" sz="1400" b="1" i="0" dirty="0">
+                <a:solidFill>
+                  <a:schemeClr val="bg2">
+                    <a:lumMod val="25000"/>
+                  </a:schemeClr>
+                </a:solidFill>
+                <a:effectLst/>
+              </a:rPr>
+              <a:t>„Dominant Desktop Traffic“</a:t>
+            </a:r>
+            <a:r>
+              <a:rPr lang="de-DE" sz="1400" b="0" i="0" dirty="0">
+                <a:solidFill>
+                  <a:schemeClr val="bg2">
+                    <a:lumMod val="25000"/>
+                  </a:schemeClr>
+                </a:solidFill>
+                <a:effectLst/>
+              </a:rPr>
+              <a:t>: Desktop-Anteil (388,4)</a:t>
+            </a:r>
+          </a:p>
+          <a:p>
+            <a:pPr algn="l">
+              <a:buFont typeface="Arial" panose="020B0604020202020204" pitchFamily="34" charset="0"/>
+              <a:buChar char="•"/>
+            </a:pPr>
+            <a:r>
+              <a:rPr lang="de-DE" sz="1400" b="1" i="0" dirty="0">
+                <a:solidFill>
+                  <a:schemeClr val="bg2">
+                    <a:lumMod val="25000"/>
+                  </a:schemeClr>
+                </a:solidFill>
+                <a:effectLst/>
+              </a:rPr>
+              <a:t>„Ausgewogener Mobile/Desktop Traffic“</a:t>
+            </a:r>
+            <a:r>
+              <a:rPr lang="de-DE" sz="1400" b="0" i="0" dirty="0">
+                <a:solidFill>
+                  <a:schemeClr val="bg2">
+                    <a:lumMod val="25000"/>
+                  </a:schemeClr>
+                </a:solidFill>
+                <a:effectLst/>
+              </a:rPr>
+              <a:t>: Mobile (46,7), Desktop (43,8)</a:t>
+            </a:r>
+          </a:p>
+          <a:p>
+            <a:pPr algn="l">
+              <a:buFont typeface="Arial" panose="020B0604020202020204" pitchFamily="34" charset="0"/>
+              <a:buChar char="•"/>
+            </a:pPr>
+            <a:r>
+              <a:rPr lang="de-DE" sz="1400" b="1" i="0" dirty="0">
+                <a:solidFill>
+                  <a:schemeClr val="bg2">
+                    <a:lumMod val="25000"/>
+                  </a:schemeClr>
+                </a:solidFill>
+                <a:effectLst/>
+              </a:rPr>
+              <a:t>„Hoher Mobile Traffic“</a:t>
+            </a:r>
+            <a:r>
+              <a:rPr lang="de-DE" sz="1400" b="0" i="0" dirty="0">
+                <a:solidFill>
+                  <a:schemeClr val="bg2">
+                    <a:lumMod val="25000"/>
+                  </a:schemeClr>
+                </a:solidFill>
+                <a:effectLst/>
+              </a:rPr>
+              <a:t>: Mobilnutzung (140,6)</a:t>
+            </a:r>
+          </a:p>
+          <a:p>
+            <a:pPr algn="l">
+              <a:buFont typeface="Arial" panose="020B0604020202020204" pitchFamily="34" charset="0"/>
+              <a:buChar char="•"/>
+            </a:pPr>
+            <a:r>
+              <a:rPr lang="de-DE" sz="1400" b="1" i="0" dirty="0">
+                <a:solidFill>
+                  <a:schemeClr val="bg2">
+                    <a:lumMod val="25000"/>
+                  </a:schemeClr>
+                </a:solidFill>
+                <a:effectLst/>
+              </a:rPr>
+              <a:t>„Stark engagierte Nutzer“</a:t>
+            </a:r>
+            <a:r>
+              <a:rPr lang="de-DE" sz="1400" b="0" i="0" dirty="0">
+                <a:solidFill>
+                  <a:schemeClr val="bg2">
+                    <a:lumMod val="25000"/>
+                  </a:schemeClr>
+                </a:solidFill>
+                <a:effectLst/>
+              </a:rPr>
+              <a:t>: Seitenaufrufe (252,9), Verweildauer (147,5 Sek.), Seiten/Sitzung (12,6)</a:t>
+            </a:r>
+          </a:p>
+          <a:p>
+            <a:pPr algn="l">
+              <a:buFont typeface="Arial" panose="020B0604020202020204" pitchFamily="34" charset="0"/>
+              <a:buChar char="•"/>
+            </a:pPr>
+            <a:r>
+              <a:rPr lang="de-DE" sz="1400" b="1" i="0" dirty="0">
+                <a:solidFill>
+                  <a:schemeClr val="bg2">
+                    <a:lumMod val="25000"/>
+                  </a:schemeClr>
+                </a:solidFill>
+                <a:effectLst/>
+              </a:rPr>
+              <a:t>„Moderates Engagement“</a:t>
+            </a:r>
+            <a:r>
+              <a:rPr lang="de-DE" sz="1400" b="0" i="0" dirty="0">
+                <a:solidFill>
+                  <a:schemeClr val="bg2">
+                    <a:lumMod val="25000"/>
+                  </a:schemeClr>
+                </a:solidFill>
+                <a:effectLst/>
+              </a:rPr>
+              <a:t>: ~90 Seitenaufrufe, ~90 Sek. Verweildauer</a:t>
+            </a:r>
+          </a:p>
+        </p:txBody>
+      </p:sp>
+    </p:spTree>
+    <p:extLst>
+      <p:ext uri="{BB962C8B-B14F-4D97-AF65-F5344CB8AC3E}">
+        <p14:creationId xmlns:p14="http://schemas.microsoft.com/office/powerpoint/2010/main" val="3407856865"/>
+      </p:ext>
+    </p:extLst>
+  </p:cSld>
+  <p:clrMapOvr>
+    <a:masterClrMapping/>
+  </p:clrMapOvr>
+</p:sld>
+</file>
+
+<file path=ppt/slides/slide12.xml><?xml version="1.0" encoding="utf-8"?>
+<p:sld xmlns:a="http://schemas.openxmlformats.org/drawingml/2006/main" xmlns:r="http://schemas.openxmlformats.org/officeDocument/2006/relationships" xmlns:p="http://schemas.openxmlformats.org/presentationml/2006/main">
+  <p:cSld>
+    <p:spTree>
+      <p:nvGrpSpPr>
+        <p:cNvPr id="1" name=""/>
+        <p:cNvGrpSpPr/>
+        <p:nvPr/>
+      </p:nvGrpSpPr>
+      <p:grpSpPr>
+        <a:xfrm>
+          <a:off x="0" y="0"/>
+          <a:ext cx="0" cy="0"/>
+          <a:chOff x="0" y="0"/>
+          <a:chExt cx="0" cy="0"/>
+        </a:xfrm>
+      </p:grpSpPr>
+      <p:pic>
+        <p:nvPicPr>
+          <p:cNvPr id="3" name="Grafik 2">
+            <a:extLst>
+              <a:ext uri="{FF2B5EF4-FFF2-40B4-BE49-F238E27FC236}">
+                <a16:creationId xmlns:a16="http://schemas.microsoft.com/office/drawing/2014/main" id="{9897DFFF-5D8B-0E0F-2D9A-C6EAE69C8807}"/>
+              </a:ext>
+            </a:extLst>
+          </p:cNvPr>
+          <p:cNvPicPr>
+            <a:picLocks noChangeAspect="1"/>
+          </p:cNvPicPr>
+          <p:nvPr/>
+        </p:nvPicPr>
+        <p:blipFill>
+          <a:blip r:embed="rId3"/>
+          <a:stretch>
+            <a:fillRect/>
+          </a:stretch>
+        </p:blipFill>
+        <p:spPr>
+          <a:xfrm>
+            <a:off x="7018215" y="0"/>
+            <a:ext cx="5173785" cy="3953331"/>
+          </a:xfrm>
+          <a:prstGeom prst="rect">
+            <a:avLst/>
+          </a:prstGeom>
+        </p:spPr>
+      </p:pic>
+      <p:pic>
+        <p:nvPicPr>
+          <p:cNvPr id="5" name="Grafik 4">
+            <a:extLst>
+              <a:ext uri="{FF2B5EF4-FFF2-40B4-BE49-F238E27FC236}">
+                <a16:creationId xmlns:a16="http://schemas.microsoft.com/office/drawing/2014/main" id="{526C4AB1-4167-1CBD-7D22-1615288A4B0A}"/>
+              </a:ext>
+            </a:extLst>
+          </p:cNvPr>
+          <p:cNvPicPr>
+            <a:picLocks noChangeAspect="1"/>
+          </p:cNvPicPr>
+          <p:nvPr/>
+        </p:nvPicPr>
+        <p:blipFill>
+          <a:blip r:embed="rId4"/>
+          <a:stretch>
+            <a:fillRect/>
+          </a:stretch>
+        </p:blipFill>
+        <p:spPr>
+          <a:xfrm>
+            <a:off x="124316" y="108528"/>
+            <a:ext cx="4899860" cy="3949053"/>
+          </a:xfrm>
+          <a:prstGeom prst="rect">
+            <a:avLst/>
+          </a:prstGeom>
+        </p:spPr>
+      </p:pic>
+      <p:sp>
+        <p:nvSpPr>
+          <p:cNvPr id="7" name="Textfeld 6">
+            <a:extLst>
+              <a:ext uri="{FF2B5EF4-FFF2-40B4-BE49-F238E27FC236}">
+                <a16:creationId xmlns:a16="http://schemas.microsoft.com/office/drawing/2014/main" id="{C6BC44C3-9A62-AB4B-2B81-1A4FB4B3112D}"/>
+              </a:ext>
+            </a:extLst>
+          </p:cNvPr>
+          <p:cNvSpPr txBox="1"/>
+          <p:nvPr/>
+        </p:nvSpPr>
+        <p:spPr>
+          <a:xfrm>
+            <a:off x="0" y="4071816"/>
+            <a:ext cx="12098215" cy="2677656"/>
+          </a:xfrm>
+          <a:prstGeom prst="rect">
+            <a:avLst/>
+          </a:prstGeom>
+          <a:noFill/>
+        </p:spPr>
+        <p:txBody>
+          <a:bodyPr wrap="square">
+            <a:spAutoFit/>
+          </a:bodyPr>
+          <a:lstStyle/>
+          <a:p>
+            <a:pPr algn="l">
+              <a:buFont typeface="Arial" panose="020B0604020202020204" pitchFamily="34" charset="0"/>
+              <a:buChar char="•"/>
+            </a:pPr>
+            <a:r>
+              <a:rPr lang="de-DE" sz="1400" b="1" i="0" dirty="0">
+                <a:solidFill>
+                  <a:schemeClr val="bg2">
+                    <a:lumMod val="25000"/>
+                  </a:schemeClr>
+                </a:solidFill>
+                <a:effectLst/>
+              </a:rPr>
+              <a:t>„Desktop Nutzer, hohe Aktivität“</a:t>
+            </a:r>
+            <a:r>
+              <a:rPr lang="de-DE" sz="1400" b="0" i="0" dirty="0">
+                <a:solidFill>
+                  <a:schemeClr val="bg2">
+                    <a:lumMod val="25000"/>
+                  </a:schemeClr>
+                </a:solidFill>
+                <a:effectLst/>
+              </a:rPr>
+              <a:t>: viele Seitenaufrufe (284,5), hohe Desktop-Nutzung (162,9), lange Verweildauer (130 Sek.)</a:t>
+            </a:r>
+          </a:p>
+          <a:p>
+            <a:pPr algn="l">
+              <a:buFont typeface="Arial" panose="020B0604020202020204" pitchFamily="34" charset="0"/>
+              <a:buChar char="•"/>
+            </a:pPr>
+            <a:r>
+              <a:rPr lang="de-DE" sz="1400" b="1" i="0" dirty="0">
+                <a:solidFill>
+                  <a:schemeClr val="bg2">
+                    <a:lumMod val="25000"/>
+                  </a:schemeClr>
+                </a:solidFill>
+                <a:effectLst/>
+              </a:rPr>
+              <a:t>„Mobile Nutzer, hohe Verweildauer“</a:t>
+            </a:r>
+            <a:r>
+              <a:rPr lang="de-DE" sz="1400" b="0" i="0" dirty="0">
+                <a:solidFill>
+                  <a:schemeClr val="bg2">
+                    <a:lumMod val="25000"/>
+                  </a:schemeClr>
+                </a:solidFill>
+                <a:effectLst/>
+              </a:rPr>
+              <a:t>: Seitenaufrufe (90,6), überwiegend mobile Geräte (48,6), Verweildauer 98 Sek.</a:t>
+            </a:r>
+          </a:p>
+          <a:p>
+            <a:pPr algn="l">
+              <a:buFont typeface="Arial" panose="020B0604020202020204" pitchFamily="34" charset="0"/>
+              <a:buChar char="•"/>
+            </a:pPr>
+            <a:r>
+              <a:rPr lang="de-DE" sz="1400" b="1" i="0" dirty="0">
+                <a:solidFill>
+                  <a:schemeClr val="bg2">
+                    <a:lumMod val="25000"/>
+                  </a:schemeClr>
+                </a:solidFill>
+                <a:effectLst/>
+              </a:rPr>
+              <a:t>„Geringe Nutzerzahl &amp; Traffic“</a:t>
+            </a:r>
+            <a:r>
+              <a:rPr lang="de-DE" sz="1400" b="0" i="0" dirty="0">
+                <a:solidFill>
+                  <a:schemeClr val="bg2">
+                    <a:lumMod val="25000"/>
+                  </a:schemeClr>
+                </a:solidFill>
+                <a:effectLst/>
+              </a:rPr>
+              <a:t>: Nutzerzahl (26,4), Sitzungen über Google/</a:t>
+            </a:r>
+            <a:r>
+              <a:rPr lang="de-DE" sz="1400" b="0" i="0" dirty="0" err="1">
+                <a:solidFill>
+                  <a:schemeClr val="bg2">
+                    <a:lumMod val="25000"/>
+                  </a:schemeClr>
+                </a:solidFill>
+                <a:effectLst/>
+              </a:rPr>
+              <a:t>Direct</a:t>
+            </a:r>
+            <a:r>
+              <a:rPr lang="de-DE" sz="1400" b="0" i="0" dirty="0">
+                <a:solidFill>
+                  <a:schemeClr val="bg2">
+                    <a:lumMod val="25000"/>
+                  </a:schemeClr>
+                </a:solidFill>
+                <a:effectLst/>
+              </a:rPr>
+              <a:t> (~12/~10)</a:t>
+            </a:r>
+          </a:p>
+          <a:p>
+            <a:pPr algn="l">
+              <a:buFont typeface="Arial" panose="020B0604020202020204" pitchFamily="34" charset="0"/>
+              <a:buChar char="•"/>
+            </a:pPr>
+            <a:r>
+              <a:rPr lang="de-DE" sz="1400" b="1" i="0" dirty="0">
+                <a:solidFill>
+                  <a:schemeClr val="bg2">
+                    <a:lumMod val="25000"/>
+                  </a:schemeClr>
+                </a:solidFill>
+                <a:effectLst/>
+              </a:rPr>
+              <a:t>„Hoher Traffic &amp; Engagement“</a:t>
+            </a:r>
+            <a:r>
+              <a:rPr lang="de-DE" sz="1400" b="0" i="0" dirty="0">
+                <a:solidFill>
+                  <a:schemeClr val="bg2">
+                    <a:lumMod val="25000"/>
+                  </a:schemeClr>
+                </a:solidFill>
+                <a:effectLst/>
+              </a:rPr>
+              <a:t>: Nutzer (76,1), Google-Traffic (55,8), Events (55,6)</a:t>
+            </a:r>
+          </a:p>
+          <a:p>
+            <a:pPr algn="l">
+              <a:buFont typeface="Arial" panose="020B0604020202020204" pitchFamily="34" charset="0"/>
+              <a:buChar char="•"/>
+            </a:pPr>
+            <a:r>
+              <a:rPr lang="de-DE" sz="1400" b="1" i="0" dirty="0">
+                <a:solidFill>
+                  <a:schemeClr val="bg2">
+                    <a:lumMod val="25000"/>
+                  </a:schemeClr>
+                </a:solidFill>
+                <a:effectLst/>
+              </a:rPr>
+              <a:t>„Kurze bis mittlere Verweildauer“</a:t>
+            </a:r>
+            <a:r>
+              <a:rPr lang="de-DE" sz="1400" b="0" i="0" dirty="0">
+                <a:solidFill>
+                  <a:schemeClr val="bg2">
+                    <a:lumMod val="25000"/>
+                  </a:schemeClr>
+                </a:solidFill>
+                <a:effectLst/>
+              </a:rPr>
+              <a:t>: Verweildauer (109 Sek.), Nutzer (28,6), Seiten/Sitzung (5,5)</a:t>
+            </a:r>
+          </a:p>
+          <a:p>
+            <a:pPr algn="l">
+              <a:buFont typeface="Arial" panose="020B0604020202020204" pitchFamily="34" charset="0"/>
+              <a:buChar char="•"/>
+            </a:pPr>
+            <a:r>
+              <a:rPr lang="de-DE" sz="1400" b="1" i="0" dirty="0">
+                <a:solidFill>
+                  <a:schemeClr val="bg2">
+                    <a:lumMod val="25000"/>
+                  </a:schemeClr>
+                </a:solidFill>
+                <a:effectLst/>
+              </a:rPr>
+              <a:t>„Hohe Nutzerzahl mit schnellen Aktionen“</a:t>
+            </a:r>
+            <a:r>
+              <a:rPr lang="de-DE" sz="1400" b="0" i="0" dirty="0">
+                <a:solidFill>
+                  <a:schemeClr val="bg2">
+                    <a:lumMod val="25000"/>
+                  </a:schemeClr>
+                </a:solidFill>
+                <a:effectLst/>
+              </a:rPr>
+              <a:t>: Nutzer (78,1), Verweildauer (95 Sek.), Events (59,4)</a:t>
+            </a:r>
+          </a:p>
+          <a:p>
+            <a:pPr algn="l">
+              <a:buFont typeface="Arial" panose="020B0604020202020204" pitchFamily="34" charset="0"/>
+              <a:buChar char="•"/>
+            </a:pPr>
+            <a:r>
+              <a:rPr lang="de-DE" sz="1400" b="1" i="0" dirty="0">
+                <a:solidFill>
+                  <a:schemeClr val="bg2">
+                    <a:lumMod val="25000"/>
+                  </a:schemeClr>
+                </a:solidFill>
+                <a:effectLst/>
+              </a:rPr>
+              <a:t>„Intensive Nutzung“</a:t>
+            </a:r>
+            <a:r>
+              <a:rPr lang="de-DE" sz="1400" b="0" i="0" dirty="0">
+                <a:solidFill>
+                  <a:schemeClr val="bg2">
+                    <a:lumMod val="25000"/>
+                  </a:schemeClr>
+                </a:solidFill>
+                <a:effectLst/>
+              </a:rPr>
+              <a:t>: sehr lange Verweildauer (471 Sek.), wenige Nutzer (2,2)</a:t>
+            </a:r>
+          </a:p>
+          <a:p>
+            <a:pPr algn="l">
+              <a:buFont typeface="Arial" panose="020B0604020202020204" pitchFamily="34" charset="0"/>
+              <a:buChar char="•"/>
+            </a:pPr>
+            <a:r>
+              <a:rPr lang="de-DE" sz="1400" b="1" i="0" dirty="0">
+                <a:solidFill>
+                  <a:schemeClr val="bg2">
+                    <a:lumMod val="25000"/>
+                  </a:schemeClr>
+                </a:solidFill>
+                <a:effectLst/>
+              </a:rPr>
+              <a:t>„Dominant Desktop Traffic“</a:t>
+            </a:r>
+            <a:r>
+              <a:rPr lang="de-DE" sz="1400" b="0" i="0" dirty="0">
+                <a:solidFill>
+                  <a:schemeClr val="bg2">
+                    <a:lumMod val="25000"/>
+                  </a:schemeClr>
+                </a:solidFill>
+                <a:effectLst/>
+              </a:rPr>
+              <a:t>: Desktop-Anteil (388,4)</a:t>
+            </a:r>
+          </a:p>
+          <a:p>
+            <a:pPr algn="l">
+              <a:buFont typeface="Arial" panose="020B0604020202020204" pitchFamily="34" charset="0"/>
+              <a:buChar char="•"/>
+            </a:pPr>
+            <a:r>
+              <a:rPr lang="de-DE" sz="1400" b="1" i="0" dirty="0">
+                <a:solidFill>
+                  <a:schemeClr val="bg2">
+                    <a:lumMod val="25000"/>
+                  </a:schemeClr>
+                </a:solidFill>
+                <a:effectLst/>
+              </a:rPr>
+              <a:t>„Ausgewogener Mobile/Desktop Traffic“</a:t>
+            </a:r>
+            <a:r>
+              <a:rPr lang="de-DE" sz="1400" b="0" i="0" dirty="0">
+                <a:solidFill>
+                  <a:schemeClr val="bg2">
+                    <a:lumMod val="25000"/>
+                  </a:schemeClr>
+                </a:solidFill>
+                <a:effectLst/>
+              </a:rPr>
+              <a:t>: Mobile (46,7), Desktop (43,8)</a:t>
+            </a:r>
+          </a:p>
+          <a:p>
+            <a:pPr algn="l">
+              <a:buFont typeface="Arial" panose="020B0604020202020204" pitchFamily="34" charset="0"/>
+              <a:buChar char="•"/>
+            </a:pPr>
+            <a:r>
+              <a:rPr lang="de-DE" sz="1400" b="1" i="0" dirty="0">
+                <a:solidFill>
+                  <a:schemeClr val="bg2">
+                    <a:lumMod val="25000"/>
+                  </a:schemeClr>
+                </a:solidFill>
+                <a:effectLst/>
+              </a:rPr>
+              <a:t>„Hoher Mobile Traffic“</a:t>
+            </a:r>
+            <a:r>
+              <a:rPr lang="de-DE" sz="1400" b="0" i="0" dirty="0">
+                <a:solidFill>
+                  <a:schemeClr val="bg2">
+                    <a:lumMod val="25000"/>
+                  </a:schemeClr>
+                </a:solidFill>
+                <a:effectLst/>
+              </a:rPr>
+              <a:t>: Mobilnutzung (140,6)</a:t>
+            </a:r>
+          </a:p>
+          <a:p>
+            <a:pPr algn="l">
+              <a:buFont typeface="Arial" panose="020B0604020202020204" pitchFamily="34" charset="0"/>
+              <a:buChar char="•"/>
+            </a:pPr>
+            <a:r>
+              <a:rPr lang="de-DE" sz="1400" b="1" i="0" dirty="0">
+                <a:solidFill>
+                  <a:schemeClr val="bg2">
+                    <a:lumMod val="25000"/>
+                  </a:schemeClr>
+                </a:solidFill>
+                <a:effectLst/>
+              </a:rPr>
+              <a:t>„Stark engagierte Nutzer“</a:t>
+            </a:r>
+            <a:r>
+              <a:rPr lang="de-DE" sz="1400" b="0" i="0" dirty="0">
+                <a:solidFill>
+                  <a:schemeClr val="bg2">
+                    <a:lumMod val="25000"/>
+                  </a:schemeClr>
+                </a:solidFill>
+                <a:effectLst/>
+              </a:rPr>
+              <a:t>: Seitenaufrufe (252,9), Verweildauer (147,5 Sek.), Seiten/Sitzung (12,6)</a:t>
+            </a:r>
+          </a:p>
+          <a:p>
+            <a:pPr algn="l">
+              <a:buFont typeface="Arial" panose="020B0604020202020204" pitchFamily="34" charset="0"/>
+              <a:buChar char="•"/>
+            </a:pPr>
+            <a:r>
+              <a:rPr lang="de-DE" sz="1400" b="1" i="0" dirty="0">
+                <a:solidFill>
+                  <a:schemeClr val="bg2">
+                    <a:lumMod val="25000"/>
+                  </a:schemeClr>
+                </a:solidFill>
+                <a:effectLst/>
+              </a:rPr>
+              <a:t>„Moderates Engagement“</a:t>
+            </a:r>
+            <a:r>
+              <a:rPr lang="de-DE" sz="1400" b="0" i="0" dirty="0">
+                <a:solidFill>
+                  <a:schemeClr val="bg2">
+                    <a:lumMod val="25000"/>
+                  </a:schemeClr>
+                </a:solidFill>
+                <a:effectLst/>
+              </a:rPr>
+              <a:t>: ~90 Seitenaufrufe, ~90 Sek. Verweildauer</a:t>
+            </a:r>
+          </a:p>
+        </p:txBody>
+      </p:sp>
+      <p:sp>
+        <p:nvSpPr>
+          <p:cNvPr id="11" name="Textfeld 10">
+            <a:extLst>
+              <a:ext uri="{FF2B5EF4-FFF2-40B4-BE49-F238E27FC236}">
+                <a16:creationId xmlns:a16="http://schemas.microsoft.com/office/drawing/2014/main" id="{3737580B-611A-E674-2C79-AD44F60DA2A2}"/>
+              </a:ext>
+            </a:extLst>
+          </p:cNvPr>
+          <p:cNvSpPr txBox="1"/>
+          <p:nvPr/>
+        </p:nvSpPr>
+        <p:spPr>
+          <a:xfrm>
+            <a:off x="5274656" y="464265"/>
+            <a:ext cx="1914210" cy="1184042"/>
+          </a:xfrm>
+          <a:prstGeom prst="rect">
+            <a:avLst/>
+          </a:prstGeom>
+          <a:noFill/>
+        </p:spPr>
+        <p:txBody>
+          <a:bodyPr wrap="square">
+            <a:spAutoFit/>
+          </a:bodyPr>
+          <a:lstStyle/>
+          <a:p>
+            <a:pPr>
+              <a:lnSpc>
+                <a:spcPts val="1425"/>
+              </a:lnSpc>
+              <a:buNone/>
+            </a:pPr>
+            <a:r>
+              <a:rPr lang="de-DE" b="1" dirty="0">
+                <a:solidFill>
+                  <a:schemeClr val="bg2">
+                    <a:lumMod val="25000"/>
+                  </a:schemeClr>
+                </a:solidFill>
+                <a:effectLst/>
+                <a:latin typeface="Consolas" panose="020B0609020204030204" pitchFamily="49" charset="0"/>
+              </a:rPr>
+              <a:t>Zeitliche Muster in Clusterverhalten: Wochentage &amp; Feiertage</a:t>
+            </a:r>
+            <a:endParaRPr lang="de-DE" b="0" dirty="0">
+              <a:solidFill>
+                <a:schemeClr val="bg2">
+                  <a:lumMod val="25000"/>
+                </a:schemeClr>
+              </a:solidFill>
+              <a:effectLst/>
+              <a:latin typeface="Consolas" panose="020B0609020204030204" pitchFamily="49" charset="0"/>
+            </a:endParaRPr>
+          </a:p>
+        </p:txBody>
+      </p:sp>
+    </p:spTree>
+    <p:extLst>
+      <p:ext uri="{BB962C8B-B14F-4D97-AF65-F5344CB8AC3E}">
+        <p14:creationId xmlns:p14="http://schemas.microsoft.com/office/powerpoint/2010/main" val="2649216444"/>
+      </p:ext>
+    </p:extLst>
+  </p:cSld>
+  <p:clrMapOvr>
+    <a:masterClrMapping/>
+  </p:clrMapOvr>
+</p:sld>
+</file>
+
+<file path=ppt/slides/slide13.xml><?xml version="1.0" encoding="utf-8"?>
+<p:sld xmlns:a="http://schemas.openxmlformats.org/drawingml/2006/main" xmlns:r="http://schemas.openxmlformats.org/officeDocument/2006/relationships" xmlns:p="http://schemas.openxmlformats.org/presentationml/2006/main">
+  <p:cSld>
+    <p:spTree>
+      <p:nvGrpSpPr>
+        <p:cNvPr id="1" name=""/>
+        <p:cNvGrpSpPr/>
+        <p:nvPr/>
+      </p:nvGrpSpPr>
+      <p:grpSpPr>
+        <a:xfrm>
+          <a:off x="0" y="0"/>
+          <a:ext cx="0" cy="0"/>
+          <a:chOff x="0" y="0"/>
+          <a:chExt cx="0" cy="0"/>
+        </a:xfrm>
+      </p:grpSpPr>
       <p:sp>
         <p:nvSpPr>
           <p:cNvPr id="5" name="Textfeld 4">
@@ -8296,7 +9705,7 @@
 </p:sld>
 </file>
 
-<file path=ppt/slides/slide12.xml><?xml version="1.0" encoding="utf-8"?>
+<file path=ppt/slides/slide14.xml><?xml version="1.0" encoding="utf-8"?>
 <p:sld xmlns:a="http://schemas.openxmlformats.org/drawingml/2006/main" xmlns:r="http://schemas.openxmlformats.org/officeDocument/2006/relationships" xmlns:p="http://schemas.openxmlformats.org/presentationml/2006/main">
   <p:cSld>
     <p:spTree>
@@ -8397,7 +9806,7 @@
 </p:sld>
 </file>
 
-<file path=ppt/slides/slide13.xml><?xml version="1.0" encoding="utf-8"?>
+<file path=ppt/slides/slide15.xml><?xml version="1.0" encoding="utf-8"?>
 <p:sld xmlns:a="http://schemas.openxmlformats.org/drawingml/2006/main" xmlns:r="http://schemas.openxmlformats.org/officeDocument/2006/relationships" xmlns:p="http://schemas.openxmlformats.org/presentationml/2006/main">
   <p:cSld>
     <p:spTree>
@@ -8788,7 +10197,7 @@
 </p:sld>
 </file>
 
-<file path=ppt/slides/slide14.xml><?xml version="1.0" encoding="utf-8"?>
+<file path=ppt/slides/slide16.xml><?xml version="1.0" encoding="utf-8"?>
 <p:sld xmlns:a="http://schemas.openxmlformats.org/drawingml/2006/main" xmlns:r="http://schemas.openxmlformats.org/officeDocument/2006/relationships" xmlns:p="http://schemas.openxmlformats.org/presentationml/2006/main">
   <p:cSld>
     <p:spTree>
@@ -9108,7 +10517,7 @@
 </p:sld>
 </file>
 
-<file path=ppt/slides/slide15.xml><?xml version="1.0" encoding="utf-8"?>
+<file path=ppt/slides/slide17.xml><?xml version="1.0" encoding="utf-8"?>
 <p:sld xmlns:a="http://schemas.openxmlformats.org/drawingml/2006/main" xmlns:r="http://schemas.openxmlformats.org/officeDocument/2006/relationships" xmlns:p="http://schemas.openxmlformats.org/presentationml/2006/main">
   <p:cSld>
     <p:spTree>
@@ -9240,7 +10649,7 @@
 </p:sld>
 </file>
 
-<file path=ppt/slides/slide16.xml><?xml version="1.0" encoding="utf-8"?>
+<file path=ppt/slides/slide18.xml><?xml version="1.0" encoding="utf-8"?>
 <p:sld xmlns:a="http://schemas.openxmlformats.org/drawingml/2006/main" xmlns:r="http://schemas.openxmlformats.org/officeDocument/2006/relationships" xmlns:p="http://schemas.openxmlformats.org/presentationml/2006/main">
   <p:cSld>
     <p:spTree>
@@ -10078,7 +11487,7 @@
 </p:sld>
 </file>
 
-<file path=ppt/slides/slide17.xml><?xml version="1.0" encoding="utf-8"?>
+<file path=ppt/slides/slide19.xml><?xml version="1.0" encoding="utf-8"?>
 <p:sld xmlns:a="http://schemas.openxmlformats.org/drawingml/2006/main" xmlns:r="http://schemas.openxmlformats.org/officeDocument/2006/relationships" xmlns:p="http://schemas.openxmlformats.org/presentationml/2006/main">
   <p:cSld>
     <p:spTree>
@@ -12269,7 +13678,7 @@
         <p:spPr>
           <a:xfrm>
             <a:off x="1482111" y="1718012"/>
-            <a:ext cx="9227778" cy="815351"/>
+            <a:ext cx="9227778" cy="1174424"/>
           </a:xfrm>
           <a:prstGeom prst="rect">
             <a:avLst/>
@@ -12281,6 +13690,33 @@
             <a:spAutoFit/>
           </a:bodyPr>
           <a:lstStyle/>
+          <a:p>
+            <a:pPr algn="ctr">
+              <a:lnSpc>
+                <a:spcPts val="1425"/>
+              </a:lnSpc>
+            </a:pPr>
+            <a:r>
+              <a:rPr lang="de-DE" sz="1400" b="1" dirty="0"/>
+              <a:t>Fragestellung:  „Welche Nutzungsmuster zeigt die Website an verschiedenen Tagen?“</a:t>
+            </a:r>
+          </a:p>
+          <a:p>
+            <a:pPr>
+              <a:lnSpc>
+                <a:spcPts val="1425"/>
+              </a:lnSpc>
+              <a:buNone/>
+            </a:pPr>
+            <a:endParaRPr lang="de-DE" sz="1400" dirty="0">
+              <a:solidFill>
+                <a:schemeClr val="tx1">
+                  <a:lumMod val="75000"/>
+                  <a:lumOff val="25000"/>
+                </a:schemeClr>
+              </a:solidFill>
+            </a:endParaRPr>
+          </a:p>
           <a:p>
             <a:pPr>
               <a:lnSpc>

</xml_diff>